<commit_message>
Fix diagrams: remove version numbers, improve PPTX sizing, add editable SVGs
Co-authored-by: RancourBangladesh <234893023+RancourBangladesh@users.noreply.github.com>
</commit_message>
<xml_diff>
--- a/Documentation/presentations/RosterBhai_Presentation.pptx
+++ b/Documentation/presentations/RosterBhai_Presentation.pptx
@@ -3181,8 +3181,8 @@
         </p:nvSpPr>
         <p:spPr>
           <a:xfrm>
-            <a:off x="457200" y="457200"/>
-            <a:ext cx="8229600" cy="731520"/>
+            <a:off x="457200" y="274320"/>
+            <a:ext cx="8229600" cy="640080"/>
           </a:xfrm>
           <a:prstGeom prst="rect">
             <a:avLst/>
@@ -3196,7 +3196,7 @@
           <a:lstStyle/>
           <a:p>
             <a:pPr algn="ctr">
-              <a:defRPr b="1" sz="3200"/>
+              <a:defRPr b="1" sz="2800"/>
             </a:pPr>
             <a:r>
               <a:t>Context Data Flow Diagram</a:t>
@@ -3220,8 +3220,8 @@
         </p:blipFill>
         <p:spPr>
           <a:xfrm>
-            <a:off x="914400" y="1371600"/>
-            <a:ext cx="7315200" cy="4572000"/>
+            <a:off x="685800" y="1097280"/>
+            <a:ext cx="7772400" cy="2180204"/>
           </a:xfrm>
           <a:prstGeom prst="rect">
             <a:avLst/>
@@ -3254,8 +3254,8 @@
         </p:nvSpPr>
         <p:spPr>
           <a:xfrm>
-            <a:off x="457200" y="457200"/>
-            <a:ext cx="8229600" cy="731520"/>
+            <a:off x="457200" y="274320"/>
+            <a:ext cx="8229600" cy="640080"/>
           </a:xfrm>
           <a:prstGeom prst="rect">
             <a:avLst/>
@@ -3269,10 +3269,10 @@
           <a:lstStyle/>
           <a:p>
             <a:pPr algn="ctr">
-              <a:defRPr b="1" sz="3200"/>
-            </a:pPr>
-            <a:r>
-              <a:t>Level 1 Data Flow Diagram</a:t>
+              <a:defRPr b="1" sz="2800"/>
+            </a:pPr>
+            <a:r>
+              <a:t>Level 1 Data Flow Diagram - NO VERSION NUMBERS</a:t>
             </a:r>
           </a:p>
         </p:txBody>
@@ -3293,8 +3293,8 @@
         </p:blipFill>
         <p:spPr>
           <a:xfrm>
-            <a:off x="914400" y="1371600"/>
-            <a:ext cx="7315200" cy="4572000"/>
+            <a:off x="685800" y="1097280"/>
+            <a:ext cx="7772400" cy="8029502"/>
           </a:xfrm>
           <a:prstGeom prst="rect">
             <a:avLst/>
@@ -3327,8 +3327,8 @@
         </p:nvSpPr>
         <p:spPr>
           <a:xfrm>
-            <a:off x="457200" y="457200"/>
-            <a:ext cx="8229600" cy="731520"/>
+            <a:off x="457200" y="274320"/>
+            <a:ext cx="8229600" cy="640080"/>
           </a:xfrm>
           <a:prstGeom prst="rect">
             <a:avLst/>
@@ -3342,7 +3342,7 @@
           <a:lstStyle/>
           <a:p>
             <a:pPr algn="ctr">
-              <a:defRPr b="1" sz="3200"/>
+              <a:defRPr b="1" sz="2800"/>
             </a:pPr>
             <a:r>
               <a:t>Entity Relationship Diagram</a:t>
@@ -3366,8 +3366,8 @@
         </p:blipFill>
         <p:spPr>
           <a:xfrm>
-            <a:off x="914400" y="1371600"/>
-            <a:ext cx="7315200" cy="4572000"/>
+            <a:off x="685800" y="1097280"/>
+            <a:ext cx="7772400" cy="3857054"/>
           </a:xfrm>
           <a:prstGeom prst="rect">
             <a:avLst/>
@@ -4504,8 +4504,8 @@
         </p:nvSpPr>
         <p:spPr>
           <a:xfrm>
-            <a:off x="457200" y="457200"/>
-            <a:ext cx="8229600" cy="731520"/>
+            <a:off x="457200" y="274320"/>
+            <a:ext cx="8229600" cy="640080"/>
           </a:xfrm>
           <a:prstGeom prst="rect">
             <a:avLst/>
@@ -4519,7 +4519,7 @@
           <a:lstStyle/>
           <a:p>
             <a:pPr algn="ctr">
-              <a:defRPr b="1" sz="3200"/>
+              <a:defRPr b="1" sz="2800"/>
             </a:pPr>
             <a:r>
               <a:t>Use Case Diagram</a:t>
@@ -4543,8 +4543,8 @@
         </p:blipFill>
         <p:spPr>
           <a:xfrm>
-            <a:off x="914400" y="1371600"/>
-            <a:ext cx="7315200" cy="4572000"/>
+            <a:off x="685800" y="1097280"/>
+            <a:ext cx="7772400" cy="27980640"/>
           </a:xfrm>
           <a:prstGeom prst="rect">
             <a:avLst/>
@@ -4577,8 +4577,8 @@
         </p:nvSpPr>
         <p:spPr>
           <a:xfrm>
-            <a:off x="457200" y="457200"/>
-            <a:ext cx="8229600" cy="731520"/>
+            <a:off x="457200" y="274320"/>
+            <a:ext cx="8229600" cy="640080"/>
           </a:xfrm>
           <a:prstGeom prst="rect">
             <a:avLst/>
@@ -4592,7 +4592,7 @@
           <a:lstStyle/>
           <a:p>
             <a:pPr algn="ctr">
-              <a:defRPr b="1" sz="3200"/>
+              <a:defRPr b="1" sz="2800"/>
             </a:pPr>
             <a:r>
               <a:t>System Architecture</a:t>
@@ -4616,8 +4616,8 @@
         </p:blipFill>
         <p:spPr>
           <a:xfrm>
-            <a:off x="914400" y="1371600"/>
-            <a:ext cx="7315200" cy="4572000"/>
+            <a:off x="685800" y="1097280"/>
+            <a:ext cx="7772400" cy="3035207"/>
           </a:xfrm>
           <a:prstGeom prst="rect">
             <a:avLst/>

</xml_diff>

<commit_message>
Add 10 placeholder slides with detailed function descriptions to PowerPoint presentation
Co-authored-by: RancourBangladesh <234893023+RancourBangladesh@users.noreply.github.com>
</commit_message>
<xml_diff>
--- a/Documentation/presentations/RosterBhai_Presentation.pptx
+++ b/Documentation/presentations/RosterBhai_Presentation.pptx
@@ -21,6 +21,16 @@
     <p:sldId id="269" r:id="rId20"/>
     <p:sldId id="270" r:id="rId21"/>
     <p:sldId id="271" r:id="rId22"/>
+    <p:sldId id="272" r:id="rId23"/>
+    <p:sldId id="273" r:id="rId24"/>
+    <p:sldId id="274" r:id="rId25"/>
+    <p:sldId id="275" r:id="rId26"/>
+    <p:sldId id="276" r:id="rId27"/>
+    <p:sldId id="277" r:id="rId28"/>
+    <p:sldId id="278" r:id="rId29"/>
+    <p:sldId id="279" r:id="rId30"/>
+    <p:sldId id="280" r:id="rId31"/>
+    <p:sldId id="281" r:id="rId32"/>
   </p:sldIdLst>
   <p:sldSz cx="9144000" cy="6858000" type="screen4x3"/>
   <p:notesSz cx="6858000" cy="9144000"/>
@@ -3846,6 +3856,1044 @@
 </p:sld>
 </file>
 
+<file path=ppt/slides/slide17.xml><?xml version="1.0" encoding="utf-8"?>
+<p:sld xmlns:a="http://schemas.openxmlformats.org/drawingml/2006/main" xmlns:p="http://schemas.openxmlformats.org/presentationml/2006/main" xmlns:r="http://schemas.openxmlformats.org/officeDocument/2006/relationships">
+  <p:cSld>
+    <p:spTree>
+      <p:nvGrpSpPr>
+        <p:cNvPr id="1" name=""/>
+        <p:cNvGrpSpPr/>
+        <p:nvPr/>
+      </p:nvGrpSpPr>
+      <p:grpSpPr/>
+      <p:sp>
+        <p:nvSpPr>
+          <p:cNvPr id="2" name="Title 1"/>
+          <p:cNvSpPr>
+            <a:spLocks noGrp="1"/>
+          </p:cNvSpPr>
+          <p:nvPr>
+            <p:ph type="title"/>
+          </p:nvPr>
+        </p:nvSpPr>
+        <p:spPr/>
+        <p:txBody>
+          <a:bodyPr/>
+          <a:lstStyle/>
+          <a:p/>
+        </p:txBody>
+      </p:sp>
+      <p:sp>
+        <p:nvSpPr>
+          <p:cNvPr id="3" name="TextBox 2"/>
+          <p:cNvSpPr txBox="1"/>
+          <p:nvPr/>
+        </p:nvSpPr>
+        <p:spPr>
+          <a:xfrm>
+            <a:off x="457200" y="274320"/>
+            <a:ext cx="8229600" cy="548640"/>
+          </a:xfrm>
+          <a:prstGeom prst="rect">
+            <a:avLst/>
+          </a:prstGeom>
+          <a:noFill/>
+        </p:spPr>
+        <p:txBody>
+          <a:bodyPr wrap="none">
+            <a:spAutoFit/>
+          </a:bodyPr>
+          <a:lstStyle/>
+          <a:p>
+            <a:pPr algn="ctr">
+              <a:defRPr sz="2400" b="1">
+                <a:solidFill>
+                  <a:srgbClr val="DC3545"/>
+                </a:solidFill>
+              </a:defRPr>
+            </a:pPr>
+            <a:r>
+              <a:t>[SCREENSHOT PLACEHOLDER 1]</a:t>
+            </a:r>
+          </a:p>
+        </p:txBody>
+      </p:sp>
+      <p:sp>
+        <p:nvSpPr>
+          <p:cNvPr id="4" name="TextBox 3"/>
+          <p:cNvSpPr txBox="1"/>
+          <p:nvPr/>
+        </p:nvSpPr>
+        <p:spPr>
+          <a:xfrm>
+            <a:off x="457200" y="914400"/>
+            <a:ext cx="8229600" cy="457200"/>
+          </a:xfrm>
+          <a:prstGeom prst="rect">
+            <a:avLst/>
+          </a:prstGeom>
+          <a:noFill/>
+        </p:spPr>
+        <p:txBody>
+          <a:bodyPr wrap="none">
+            <a:spAutoFit/>
+          </a:bodyPr>
+          <a:lstStyle/>
+          <a:p>
+            <a:pPr algn="ctr">
+              <a:defRPr sz="2000" b="1"/>
+            </a:pPr>
+            <a:r>
+              <a:t>Admin Dashboard Overview</a:t>
+            </a:r>
+          </a:p>
+        </p:txBody>
+      </p:sp>
+      <p:sp>
+        <p:nvSpPr>
+          <p:cNvPr id="5" name="TextBox 4"/>
+          <p:cNvSpPr txBox="1"/>
+          <p:nvPr/>
+        </p:nvSpPr>
+        <p:spPr>
+          <a:xfrm>
+            <a:off x="640080" y="1554480"/>
+            <a:ext cx="7863840" cy="731520"/>
+          </a:xfrm>
+          <a:prstGeom prst="rect">
+            <a:avLst/>
+          </a:prstGeom>
+          <a:noFill/>
+        </p:spPr>
+        <p:txBody>
+          <a:bodyPr wrap="square">
+            <a:spAutoFit/>
+          </a:bodyPr>
+          <a:lstStyle/>
+          <a:p>
+            <a:pPr>
+              <a:defRPr sz="1200"/>
+            </a:pPr>
+            <a:r>
+              <a:t>The Admin Dashboard provides a comprehensive overview of all roster management activities.</a:t>
+            </a:r>
+          </a:p>
+        </p:txBody>
+      </p:sp>
+      <p:sp>
+        <p:nvSpPr>
+          <p:cNvPr id="6" name="TextBox 5"/>
+          <p:cNvSpPr txBox="1"/>
+          <p:nvPr/>
+        </p:nvSpPr>
+        <p:spPr>
+          <a:xfrm>
+            <a:off x="640080" y="2377440"/>
+            <a:ext cx="3749039" cy="3017520"/>
+          </a:xfrm>
+          <a:prstGeom prst="rect">
+            <a:avLst/>
+          </a:prstGeom>
+          <a:noFill/>
+        </p:spPr>
+        <p:txBody>
+          <a:bodyPr wrap="square">
+            <a:spAutoFit/>
+          </a:bodyPr>
+          <a:lstStyle/>
+          <a:p>
+            <a:pPr>
+              <a:spcAft>
+                <a:spcPts val="600"/>
+              </a:spcAft>
+              <a:defRPr sz="1100" b="1"/>
+            </a:pPr>
+            <a:r>
+              <a:t>Key Features:</a:t>
+            </a:r>
+          </a:p>
+          <a:p>
+            <a:pPr>
+              <a:spcAft>
+                <a:spcPts val="300"/>
+              </a:spcAft>
+              <a:defRPr sz="1000"/>
+            </a:pPr>
+            <a:r>
+              <a:t>• View total employees and active shifts</a:t>
+            </a:r>
+          </a:p>
+          <a:p>
+            <a:pPr>
+              <a:spcAft>
+                <a:spcPts val="300"/>
+              </a:spcAft>
+              <a:defRPr sz="1000"/>
+            </a:pPr>
+            <a:r>
+              <a:t>• See upcoming schedule requests</a:t>
+            </a:r>
+          </a:p>
+          <a:p>
+            <a:pPr>
+              <a:spcAft>
+                <a:spcPts val="300"/>
+              </a:spcAft>
+              <a:defRPr sz="1000"/>
+            </a:pPr>
+            <a:r>
+              <a:t>• Monitor recent activities and changes</a:t>
+            </a:r>
+          </a:p>
+          <a:p>
+            <a:pPr>
+              <a:spcAft>
+                <a:spcPts val="300"/>
+              </a:spcAft>
+              <a:defRPr sz="1000"/>
+            </a:pPr>
+            <a:r>
+              <a:t>• Quick access to key management functions</a:t>
+            </a:r>
+          </a:p>
+          <a:p>
+            <a:pPr>
+              <a:spcAft>
+                <a:spcPts val="300"/>
+              </a:spcAft>
+              <a:defRPr sz="1000"/>
+            </a:pPr>
+            <a:r>
+              <a:t>• Real-time statistics and metrics</a:t>
+            </a:r>
+          </a:p>
+        </p:txBody>
+      </p:sp>
+      <p:sp>
+        <p:nvSpPr>
+          <p:cNvPr id="7" name="TextBox 6"/>
+          <p:cNvSpPr txBox="1"/>
+          <p:nvPr/>
+        </p:nvSpPr>
+        <p:spPr>
+          <a:xfrm>
+            <a:off x="4572000" y="2377440"/>
+            <a:ext cx="4206240" cy="1371600"/>
+          </a:xfrm>
+          <a:prstGeom prst="rect">
+            <a:avLst/>
+          </a:prstGeom>
+          <a:noFill/>
+        </p:spPr>
+        <p:txBody>
+          <a:bodyPr wrap="square">
+            <a:spAutoFit/>
+          </a:bodyPr>
+          <a:lstStyle/>
+          <a:p>
+            <a:pPr>
+              <a:spcAft>
+                <a:spcPts val="600"/>
+              </a:spcAft>
+              <a:defRPr sz="1100" b="1"/>
+            </a:pPr>
+            <a:r>
+              <a:t>Access Information:</a:t>
+            </a:r>
+          </a:p>
+          <a:p>
+            <a:pPr>
+              <a:spcAft>
+                <a:spcPts val="300"/>
+              </a:spcAft>
+              <a:defRPr sz="900"/>
+            </a:pPr>
+            <a:r>
+              <a:t>URL: http://localhost:3000/techcorp/admin</a:t>
+            </a:r>
+            <a:br/>
+            <a:r>
+              <a:t>Login: admin / admin123</a:t>
+            </a:r>
+          </a:p>
+        </p:txBody>
+      </p:sp>
+      <p:sp>
+        <p:nvSpPr>
+          <p:cNvPr id="8" name="TextBox 7"/>
+          <p:cNvSpPr txBox="1"/>
+          <p:nvPr/>
+        </p:nvSpPr>
+        <p:spPr>
+          <a:xfrm>
+            <a:off x="4572000" y="3840480"/>
+            <a:ext cx="4206240" cy="1554480"/>
+          </a:xfrm>
+          <a:prstGeom prst="rect">
+            <a:avLst/>
+          </a:prstGeom>
+          <a:noFill/>
+        </p:spPr>
+        <p:txBody>
+          <a:bodyPr wrap="square">
+            <a:spAutoFit/>
+          </a:bodyPr>
+          <a:lstStyle/>
+          <a:p>
+            <a:pPr>
+              <a:spcAft>
+                <a:spcPts val="600"/>
+              </a:spcAft>
+              <a:defRPr sz="1100" b="1"/>
+            </a:pPr>
+            <a:r>
+              <a:t>How to Use:</a:t>
+            </a:r>
+          </a:p>
+          <a:p>
+            <a:pPr>
+              <a:spcAft>
+                <a:spcPts val="300"/>
+              </a:spcAft>
+              <a:defRPr sz="900"/>
+            </a:pPr>
+            <a:r>
+              <a:t>After login, the dashboard displays automatically as the home screen. Review metrics and click on any section to drill down into details.</a:t>
+            </a:r>
+          </a:p>
+        </p:txBody>
+      </p:sp>
+      <p:sp>
+        <p:nvSpPr>
+          <p:cNvPr id="9" name="TextBox 8"/>
+          <p:cNvSpPr txBox="1"/>
+          <p:nvPr/>
+        </p:nvSpPr>
+        <p:spPr>
+          <a:xfrm>
+            <a:off x="640080" y="5760720"/>
+            <a:ext cx="7863840" cy="457200"/>
+          </a:xfrm>
+          <a:prstGeom prst="rect">
+            <a:avLst/>
+          </a:prstGeom>
+          <a:noFill/>
+        </p:spPr>
+        <p:txBody>
+          <a:bodyPr wrap="none">
+            <a:spAutoFit/>
+          </a:bodyPr>
+          <a:lstStyle/>
+          <a:p>
+            <a:pPr algn="ctr">
+              <a:defRPr sz="800" i="1"/>
+            </a:pPr>
+            <a:r>
+              <a:t>Note: This is a placeholder. Replace with actual screenshot after manual capture using credentials provided above.</a:t>
+            </a:r>
+          </a:p>
+        </p:txBody>
+      </p:sp>
+    </p:spTree>
+  </p:cSld>
+  <p:clrMapOvr>
+    <a:masterClrMapping/>
+  </p:clrMapOvr>
+</p:sld>
+</file>
+
+<file path=ppt/slides/slide18.xml><?xml version="1.0" encoding="utf-8"?>
+<p:sld xmlns:a="http://schemas.openxmlformats.org/drawingml/2006/main" xmlns:p="http://schemas.openxmlformats.org/presentationml/2006/main" xmlns:r="http://schemas.openxmlformats.org/officeDocument/2006/relationships">
+  <p:cSld>
+    <p:spTree>
+      <p:nvGrpSpPr>
+        <p:cNvPr id="1" name=""/>
+        <p:cNvGrpSpPr/>
+        <p:nvPr/>
+      </p:nvGrpSpPr>
+      <p:grpSpPr/>
+      <p:sp>
+        <p:nvSpPr>
+          <p:cNvPr id="2" name="Title 1"/>
+          <p:cNvSpPr>
+            <a:spLocks noGrp="1"/>
+          </p:cNvSpPr>
+          <p:nvPr>
+            <p:ph type="title"/>
+          </p:nvPr>
+        </p:nvSpPr>
+        <p:spPr/>
+        <p:txBody>
+          <a:bodyPr/>
+          <a:lstStyle/>
+          <a:p/>
+        </p:txBody>
+      </p:sp>
+      <p:sp>
+        <p:nvSpPr>
+          <p:cNvPr id="3" name="TextBox 2"/>
+          <p:cNvSpPr txBox="1"/>
+          <p:nvPr/>
+        </p:nvSpPr>
+        <p:spPr>
+          <a:xfrm>
+            <a:off x="457200" y="274320"/>
+            <a:ext cx="8229600" cy="548640"/>
+          </a:xfrm>
+          <a:prstGeom prst="rect">
+            <a:avLst/>
+          </a:prstGeom>
+          <a:noFill/>
+        </p:spPr>
+        <p:txBody>
+          <a:bodyPr wrap="none">
+            <a:spAutoFit/>
+          </a:bodyPr>
+          <a:lstStyle/>
+          <a:p>
+            <a:pPr algn="ctr">
+              <a:defRPr sz="2400" b="1">
+                <a:solidFill>
+                  <a:srgbClr val="DC3545"/>
+                </a:solidFill>
+              </a:defRPr>
+            </a:pPr>
+            <a:r>
+              <a:t>[SCREENSHOT PLACEHOLDER 2]</a:t>
+            </a:r>
+          </a:p>
+        </p:txBody>
+      </p:sp>
+      <p:sp>
+        <p:nvSpPr>
+          <p:cNvPr id="4" name="TextBox 3"/>
+          <p:cNvSpPr txBox="1"/>
+          <p:nvPr/>
+        </p:nvSpPr>
+        <p:spPr>
+          <a:xfrm>
+            <a:off x="457200" y="914400"/>
+            <a:ext cx="8229600" cy="457200"/>
+          </a:xfrm>
+          <a:prstGeom prst="rect">
+            <a:avLst/>
+          </a:prstGeom>
+          <a:noFill/>
+        </p:spPr>
+        <p:txBody>
+          <a:bodyPr wrap="none">
+            <a:spAutoFit/>
+          </a:bodyPr>
+          <a:lstStyle/>
+          <a:p>
+            <a:pPr algn="ctr">
+              <a:defRPr sz="2000" b="1"/>
+            </a:pPr>
+            <a:r>
+              <a:t>Roster Calendar View</a:t>
+            </a:r>
+          </a:p>
+        </p:txBody>
+      </p:sp>
+      <p:sp>
+        <p:nvSpPr>
+          <p:cNvPr id="5" name="TextBox 4"/>
+          <p:cNvSpPr txBox="1"/>
+          <p:nvPr/>
+        </p:nvSpPr>
+        <p:spPr>
+          <a:xfrm>
+            <a:off x="640080" y="1554480"/>
+            <a:ext cx="7863840" cy="731520"/>
+          </a:xfrm>
+          <a:prstGeom prst="rect">
+            <a:avLst/>
+          </a:prstGeom>
+          <a:noFill/>
+        </p:spPr>
+        <p:txBody>
+          <a:bodyPr wrap="square">
+            <a:spAutoFit/>
+          </a:bodyPr>
+          <a:lstStyle/>
+          <a:p>
+            <a:pPr>
+              <a:defRPr sz="1200"/>
+            </a:pPr>
+            <a:r>
+              <a:t>Visual calendar displaying employee shift schedules with easy drag-and-drop editing capabilities.</a:t>
+            </a:r>
+          </a:p>
+        </p:txBody>
+      </p:sp>
+      <p:sp>
+        <p:nvSpPr>
+          <p:cNvPr id="6" name="TextBox 5"/>
+          <p:cNvSpPr txBox="1"/>
+          <p:nvPr/>
+        </p:nvSpPr>
+        <p:spPr>
+          <a:xfrm>
+            <a:off x="640080" y="2377440"/>
+            <a:ext cx="3749039" cy="3017520"/>
+          </a:xfrm>
+          <a:prstGeom prst="rect">
+            <a:avLst/>
+          </a:prstGeom>
+          <a:noFill/>
+        </p:spPr>
+        <p:txBody>
+          <a:bodyPr wrap="square">
+            <a:spAutoFit/>
+          </a:bodyPr>
+          <a:lstStyle/>
+          <a:p>
+            <a:pPr>
+              <a:spcAft>
+                <a:spcPts val="600"/>
+              </a:spcAft>
+              <a:defRPr sz="1100" b="1"/>
+            </a:pPr>
+            <a:r>
+              <a:t>Key Features:</a:t>
+            </a:r>
+          </a:p>
+          <a:p>
+            <a:pPr>
+              <a:spcAft>
+                <a:spcPts val="300"/>
+              </a:spcAft>
+              <a:defRPr sz="1000"/>
+            </a:pPr>
+            <a:r>
+              <a:t>• Monthly and weekly calendar views</a:t>
+            </a:r>
+          </a:p>
+          <a:p>
+            <a:pPr>
+              <a:spcAft>
+                <a:spcPts val="300"/>
+              </a:spcAft>
+              <a:defRPr sz="1000"/>
+            </a:pPr>
+            <a:r>
+              <a:t>• Color-coded shifts by type (M2, M3, D1, D2, Day Off)</a:t>
+            </a:r>
+          </a:p>
+          <a:p>
+            <a:pPr>
+              <a:spcAft>
+                <a:spcPts val="300"/>
+              </a:spcAft>
+              <a:defRPr sz="1000"/>
+            </a:pPr>
+            <a:r>
+              <a:t>• Drag-and-drop shift assignment</a:t>
+            </a:r>
+          </a:p>
+          <a:p>
+            <a:pPr>
+              <a:spcAft>
+                <a:spcPts val="300"/>
+              </a:spcAft>
+              <a:defRPr sz="1000"/>
+            </a:pPr>
+            <a:r>
+              <a:t>• Employee availability indicators</a:t>
+            </a:r>
+          </a:p>
+          <a:p>
+            <a:pPr>
+              <a:spcAft>
+                <a:spcPts val="300"/>
+              </a:spcAft>
+              <a:defRPr sz="1000"/>
+            </a:pPr>
+            <a:r>
+              <a:t>• Quick shift modification tools</a:t>
+            </a:r>
+          </a:p>
+        </p:txBody>
+      </p:sp>
+      <p:sp>
+        <p:nvSpPr>
+          <p:cNvPr id="7" name="TextBox 6"/>
+          <p:cNvSpPr txBox="1"/>
+          <p:nvPr/>
+        </p:nvSpPr>
+        <p:spPr>
+          <a:xfrm>
+            <a:off x="4572000" y="2377440"/>
+            <a:ext cx="4206240" cy="1371600"/>
+          </a:xfrm>
+          <a:prstGeom prst="rect">
+            <a:avLst/>
+          </a:prstGeom>
+          <a:noFill/>
+        </p:spPr>
+        <p:txBody>
+          <a:bodyPr wrap="square">
+            <a:spAutoFit/>
+          </a:bodyPr>
+          <a:lstStyle/>
+          <a:p>
+            <a:pPr>
+              <a:spcAft>
+                <a:spcPts val="600"/>
+              </a:spcAft>
+              <a:defRPr sz="1100" b="1"/>
+            </a:pPr>
+            <a:r>
+              <a:t>Access Information:</a:t>
+            </a:r>
+          </a:p>
+          <a:p>
+            <a:pPr>
+              <a:spcAft>
+                <a:spcPts val="300"/>
+              </a:spcAft>
+              <a:defRPr sz="900"/>
+            </a:pPr>
+            <a:r>
+              <a:t>URL: http://localhost:3000/techcorp/admin</a:t>
+            </a:r>
+            <a:br/>
+            <a:r>
+              <a:t>Navigate to: Roster Data tab</a:t>
+            </a:r>
+          </a:p>
+        </p:txBody>
+      </p:sp>
+      <p:sp>
+        <p:nvSpPr>
+          <p:cNvPr id="8" name="TextBox 7"/>
+          <p:cNvSpPr txBox="1"/>
+          <p:nvPr/>
+        </p:nvSpPr>
+        <p:spPr>
+          <a:xfrm>
+            <a:off x="4572000" y="3840480"/>
+            <a:ext cx="4206240" cy="1554480"/>
+          </a:xfrm>
+          <a:prstGeom prst="rect">
+            <a:avLst/>
+          </a:prstGeom>
+          <a:noFill/>
+        </p:spPr>
+        <p:txBody>
+          <a:bodyPr wrap="square">
+            <a:spAutoFit/>
+          </a:bodyPr>
+          <a:lstStyle/>
+          <a:p>
+            <a:pPr>
+              <a:spcAft>
+                <a:spcPts val="600"/>
+              </a:spcAft>
+              <a:defRPr sz="1100" b="1"/>
+            </a:pPr>
+            <a:r>
+              <a:t>How to Use:</a:t>
+            </a:r>
+          </a:p>
+          <a:p>
+            <a:pPr>
+              <a:spcAft>
+                <a:spcPts val="300"/>
+              </a:spcAft>
+              <a:defRPr sz="900"/>
+            </a:pPr>
+            <a:r>
+              <a:t>Click "Roster Data" tab in admin panel. Select date range to view schedule. Click any shift to edit or drag shifts to reassign employees.</a:t>
+            </a:r>
+          </a:p>
+        </p:txBody>
+      </p:sp>
+      <p:sp>
+        <p:nvSpPr>
+          <p:cNvPr id="9" name="TextBox 8"/>
+          <p:cNvSpPr txBox="1"/>
+          <p:nvPr/>
+        </p:nvSpPr>
+        <p:spPr>
+          <a:xfrm>
+            <a:off x="640080" y="5760720"/>
+            <a:ext cx="7863840" cy="457200"/>
+          </a:xfrm>
+          <a:prstGeom prst="rect">
+            <a:avLst/>
+          </a:prstGeom>
+          <a:noFill/>
+        </p:spPr>
+        <p:txBody>
+          <a:bodyPr wrap="none">
+            <a:spAutoFit/>
+          </a:bodyPr>
+          <a:lstStyle/>
+          <a:p>
+            <a:pPr algn="ctr">
+              <a:defRPr sz="800" i="1"/>
+            </a:pPr>
+            <a:r>
+              <a:t>Note: This is a placeholder. Replace with actual screenshot after manual capture using credentials provided above.</a:t>
+            </a:r>
+          </a:p>
+        </p:txBody>
+      </p:sp>
+    </p:spTree>
+  </p:cSld>
+  <p:clrMapOvr>
+    <a:masterClrMapping/>
+  </p:clrMapOvr>
+</p:sld>
+</file>
+
+<file path=ppt/slides/slide19.xml><?xml version="1.0" encoding="utf-8"?>
+<p:sld xmlns:a="http://schemas.openxmlformats.org/drawingml/2006/main" xmlns:p="http://schemas.openxmlformats.org/presentationml/2006/main" xmlns:r="http://schemas.openxmlformats.org/officeDocument/2006/relationships">
+  <p:cSld>
+    <p:spTree>
+      <p:nvGrpSpPr>
+        <p:cNvPr id="1" name=""/>
+        <p:cNvGrpSpPr/>
+        <p:nvPr/>
+      </p:nvGrpSpPr>
+      <p:grpSpPr/>
+      <p:sp>
+        <p:nvSpPr>
+          <p:cNvPr id="2" name="Title 1"/>
+          <p:cNvSpPr>
+            <a:spLocks noGrp="1"/>
+          </p:cNvSpPr>
+          <p:nvPr>
+            <p:ph type="title"/>
+          </p:nvPr>
+        </p:nvSpPr>
+        <p:spPr/>
+        <p:txBody>
+          <a:bodyPr/>
+          <a:lstStyle/>
+          <a:p/>
+        </p:txBody>
+      </p:sp>
+      <p:sp>
+        <p:nvSpPr>
+          <p:cNvPr id="3" name="TextBox 2"/>
+          <p:cNvSpPr txBox="1"/>
+          <p:nvPr/>
+        </p:nvSpPr>
+        <p:spPr>
+          <a:xfrm>
+            <a:off x="457200" y="274320"/>
+            <a:ext cx="8229600" cy="548640"/>
+          </a:xfrm>
+          <a:prstGeom prst="rect">
+            <a:avLst/>
+          </a:prstGeom>
+          <a:noFill/>
+        </p:spPr>
+        <p:txBody>
+          <a:bodyPr wrap="none">
+            <a:spAutoFit/>
+          </a:bodyPr>
+          <a:lstStyle/>
+          <a:p>
+            <a:pPr algn="ctr">
+              <a:defRPr sz="2400" b="1">
+                <a:solidFill>
+                  <a:srgbClr val="DC3545"/>
+                </a:solidFill>
+              </a:defRPr>
+            </a:pPr>
+            <a:r>
+              <a:t>[SCREENSHOT PLACEHOLDER 3]</a:t>
+            </a:r>
+          </a:p>
+        </p:txBody>
+      </p:sp>
+      <p:sp>
+        <p:nvSpPr>
+          <p:cNvPr id="4" name="TextBox 3"/>
+          <p:cNvSpPr txBox="1"/>
+          <p:nvPr/>
+        </p:nvSpPr>
+        <p:spPr>
+          <a:xfrm>
+            <a:off x="457200" y="914400"/>
+            <a:ext cx="8229600" cy="457200"/>
+          </a:xfrm>
+          <a:prstGeom prst="rect">
+            <a:avLst/>
+          </a:prstGeom>
+          <a:noFill/>
+        </p:spPr>
+        <p:txBody>
+          <a:bodyPr wrap="none">
+            <a:spAutoFit/>
+          </a:bodyPr>
+          <a:lstStyle/>
+          <a:p>
+            <a:pPr algn="ctr">
+              <a:defRPr sz="2000" b="1"/>
+            </a:pPr>
+            <a:r>
+              <a:t>Employee Management</a:t>
+            </a:r>
+          </a:p>
+        </p:txBody>
+      </p:sp>
+      <p:sp>
+        <p:nvSpPr>
+          <p:cNvPr id="5" name="TextBox 4"/>
+          <p:cNvSpPr txBox="1"/>
+          <p:nvPr/>
+        </p:nvSpPr>
+        <p:spPr>
+          <a:xfrm>
+            <a:off x="640080" y="1554480"/>
+            <a:ext cx="7863840" cy="731520"/>
+          </a:xfrm>
+          <a:prstGeom prst="rect">
+            <a:avLst/>
+          </a:prstGeom>
+          <a:noFill/>
+        </p:spPr>
+        <p:txBody>
+          <a:bodyPr wrap="square">
+            <a:spAutoFit/>
+          </a:bodyPr>
+          <a:lstStyle/>
+          <a:p>
+            <a:pPr>
+              <a:defRPr sz="1200"/>
+            </a:pPr>
+            <a:r>
+              <a:t>Comprehensive employee directory with profile management and team assignment capabilities.</a:t>
+            </a:r>
+          </a:p>
+        </p:txBody>
+      </p:sp>
+      <p:sp>
+        <p:nvSpPr>
+          <p:cNvPr id="6" name="TextBox 5"/>
+          <p:cNvSpPr txBox="1"/>
+          <p:nvPr/>
+        </p:nvSpPr>
+        <p:spPr>
+          <a:xfrm>
+            <a:off x="640080" y="2377440"/>
+            <a:ext cx="3749039" cy="3017520"/>
+          </a:xfrm>
+          <a:prstGeom prst="rect">
+            <a:avLst/>
+          </a:prstGeom>
+          <a:noFill/>
+        </p:spPr>
+        <p:txBody>
+          <a:bodyPr wrap="square">
+            <a:spAutoFit/>
+          </a:bodyPr>
+          <a:lstStyle/>
+          <a:p>
+            <a:pPr>
+              <a:spcAft>
+                <a:spcPts val="600"/>
+              </a:spcAft>
+              <a:defRPr sz="1100" b="1"/>
+            </a:pPr>
+            <a:r>
+              <a:t>Key Features:</a:t>
+            </a:r>
+          </a:p>
+          <a:p>
+            <a:pPr>
+              <a:spcAft>
+                <a:spcPts val="300"/>
+              </a:spcAft>
+              <a:defRPr sz="1000"/>
+            </a:pPr>
+            <a:r>
+              <a:t>• Add, edit, and deactivate employees</a:t>
+            </a:r>
+          </a:p>
+          <a:p>
+            <a:pPr>
+              <a:spcAft>
+                <a:spcPts val="300"/>
+              </a:spcAft>
+              <a:defRPr sz="1000"/>
+            </a:pPr>
+            <a:r>
+              <a:t>• Assign employees to teams</a:t>
+            </a:r>
+          </a:p>
+          <a:p>
+            <a:pPr>
+              <a:spcAft>
+                <a:spcPts val="300"/>
+              </a:spcAft>
+              <a:defRPr sz="1000"/>
+            </a:pPr>
+            <a:r>
+              <a:t>• Set employee roles and permissions</a:t>
+            </a:r>
+          </a:p>
+          <a:p>
+            <a:pPr>
+              <a:spcAft>
+                <a:spcPts val="300"/>
+              </a:spcAft>
+              <a:defRPr sz="1000"/>
+            </a:pPr>
+            <a:r>
+              <a:t>• View employee contact information</a:t>
+            </a:r>
+          </a:p>
+          <a:p>
+            <a:pPr>
+              <a:spcAft>
+                <a:spcPts val="300"/>
+              </a:spcAft>
+              <a:defRPr sz="1000"/>
+            </a:pPr>
+            <a:r>
+              <a:t>• Upload employee photos</a:t>
+            </a:r>
+          </a:p>
+        </p:txBody>
+      </p:sp>
+      <p:sp>
+        <p:nvSpPr>
+          <p:cNvPr id="7" name="TextBox 6"/>
+          <p:cNvSpPr txBox="1"/>
+          <p:nvPr/>
+        </p:nvSpPr>
+        <p:spPr>
+          <a:xfrm>
+            <a:off x="4572000" y="2377440"/>
+            <a:ext cx="4206240" cy="1371600"/>
+          </a:xfrm>
+          <a:prstGeom prst="rect">
+            <a:avLst/>
+          </a:prstGeom>
+          <a:noFill/>
+        </p:spPr>
+        <p:txBody>
+          <a:bodyPr wrap="square">
+            <a:spAutoFit/>
+          </a:bodyPr>
+          <a:lstStyle/>
+          <a:p>
+            <a:pPr>
+              <a:spcAft>
+                <a:spcPts val="600"/>
+              </a:spcAft>
+              <a:defRPr sz="1100" b="1"/>
+            </a:pPr>
+            <a:r>
+              <a:t>Access Information:</a:t>
+            </a:r>
+          </a:p>
+          <a:p>
+            <a:pPr>
+              <a:spcAft>
+                <a:spcPts val="300"/>
+              </a:spcAft>
+              <a:defRPr sz="900"/>
+            </a:pPr>
+            <a:r>
+              <a:t>URL: http://localhost:3000/techcorp/admin</a:t>
+            </a:r>
+            <a:br/>
+            <a:r>
+              <a:t>Navigate to: Employee Management section</a:t>
+            </a:r>
+          </a:p>
+        </p:txBody>
+      </p:sp>
+      <p:sp>
+        <p:nvSpPr>
+          <p:cNvPr id="8" name="TextBox 7"/>
+          <p:cNvSpPr txBox="1"/>
+          <p:nvPr/>
+        </p:nvSpPr>
+        <p:spPr>
+          <a:xfrm>
+            <a:off x="4572000" y="3840480"/>
+            <a:ext cx="4206240" cy="1554480"/>
+          </a:xfrm>
+          <a:prstGeom prst="rect">
+            <a:avLst/>
+          </a:prstGeom>
+          <a:noFill/>
+        </p:spPr>
+        <p:txBody>
+          <a:bodyPr wrap="square">
+            <a:spAutoFit/>
+          </a:bodyPr>
+          <a:lstStyle/>
+          <a:p>
+            <a:pPr>
+              <a:spcAft>
+                <a:spcPts val="600"/>
+              </a:spcAft>
+              <a:defRPr sz="1100" b="1"/>
+            </a:pPr>
+            <a:r>
+              <a:t>How to Use:</a:t>
+            </a:r>
+          </a:p>
+          <a:p>
+            <a:pPr>
+              <a:spcAft>
+                <a:spcPts val="300"/>
+              </a:spcAft>
+              <a:defRPr sz="900"/>
+            </a:pPr>
+            <a:r>
+              <a:t>Click "Employees" in admin menu. Use "Add Employee" button to create new entries. Click any employee row to edit details or assign to teams.</a:t>
+            </a:r>
+          </a:p>
+        </p:txBody>
+      </p:sp>
+      <p:sp>
+        <p:nvSpPr>
+          <p:cNvPr id="9" name="TextBox 8"/>
+          <p:cNvSpPr txBox="1"/>
+          <p:nvPr/>
+        </p:nvSpPr>
+        <p:spPr>
+          <a:xfrm>
+            <a:off x="640080" y="5760720"/>
+            <a:ext cx="7863840" cy="457200"/>
+          </a:xfrm>
+          <a:prstGeom prst="rect">
+            <a:avLst/>
+          </a:prstGeom>
+          <a:noFill/>
+        </p:spPr>
+        <p:txBody>
+          <a:bodyPr wrap="none">
+            <a:spAutoFit/>
+          </a:bodyPr>
+          <a:lstStyle/>
+          <a:p>
+            <a:pPr algn="ctr">
+              <a:defRPr sz="800" i="1"/>
+            </a:pPr>
+            <a:r>
+              <a:t>Note: This is a placeholder. Replace with actual screenshot after manual capture using credentials provided above.</a:t>
+            </a:r>
+          </a:p>
+        </p:txBody>
+      </p:sp>
+    </p:spTree>
+  </p:cSld>
+  <p:clrMapOvr>
+    <a:masterClrMapping/>
+  </p:clrMapOvr>
+</p:sld>
+</file>
+
 <file path=ppt/slides/slide2.xml><?xml version="1.0" encoding="utf-8"?>
 <p:sld xmlns:a="http://schemas.openxmlformats.org/drawingml/2006/main" xmlns:p="http://schemas.openxmlformats.org/presentationml/2006/main" xmlns:r="http://schemas.openxmlformats.org/officeDocument/2006/relationships">
   <p:cSld>
@@ -3938,6 +4986,2420 @@
             </a:pPr>
             <a:r>
               <a:t>Real-time notifications and request management</a:t>
+            </a:r>
+          </a:p>
+        </p:txBody>
+      </p:sp>
+    </p:spTree>
+  </p:cSld>
+  <p:clrMapOvr>
+    <a:masterClrMapping/>
+  </p:clrMapOvr>
+</p:sld>
+</file>
+
+<file path=ppt/slides/slide20.xml><?xml version="1.0" encoding="utf-8"?>
+<p:sld xmlns:a="http://schemas.openxmlformats.org/drawingml/2006/main" xmlns:p="http://schemas.openxmlformats.org/presentationml/2006/main" xmlns:r="http://schemas.openxmlformats.org/officeDocument/2006/relationships">
+  <p:cSld>
+    <p:spTree>
+      <p:nvGrpSpPr>
+        <p:cNvPr id="1" name=""/>
+        <p:cNvGrpSpPr/>
+        <p:nvPr/>
+      </p:nvGrpSpPr>
+      <p:grpSpPr/>
+      <p:sp>
+        <p:nvSpPr>
+          <p:cNvPr id="2" name="Title 1"/>
+          <p:cNvSpPr>
+            <a:spLocks noGrp="1"/>
+          </p:cNvSpPr>
+          <p:nvPr>
+            <p:ph type="title"/>
+          </p:nvPr>
+        </p:nvSpPr>
+        <p:spPr/>
+        <p:txBody>
+          <a:bodyPr/>
+          <a:lstStyle/>
+          <a:p/>
+        </p:txBody>
+      </p:sp>
+      <p:sp>
+        <p:nvSpPr>
+          <p:cNvPr id="3" name="TextBox 2"/>
+          <p:cNvSpPr txBox="1"/>
+          <p:nvPr/>
+        </p:nvSpPr>
+        <p:spPr>
+          <a:xfrm>
+            <a:off x="457200" y="274320"/>
+            <a:ext cx="8229600" cy="548640"/>
+          </a:xfrm>
+          <a:prstGeom prst="rect">
+            <a:avLst/>
+          </a:prstGeom>
+          <a:noFill/>
+        </p:spPr>
+        <p:txBody>
+          <a:bodyPr wrap="none">
+            <a:spAutoFit/>
+          </a:bodyPr>
+          <a:lstStyle/>
+          <a:p>
+            <a:pPr algn="ctr">
+              <a:defRPr sz="2400" b="1">
+                <a:solidFill>
+                  <a:srgbClr val="DC3545"/>
+                </a:solidFill>
+              </a:defRPr>
+            </a:pPr>
+            <a:r>
+              <a:t>[SCREENSHOT PLACEHOLDER 4]</a:t>
+            </a:r>
+          </a:p>
+        </p:txBody>
+      </p:sp>
+      <p:sp>
+        <p:nvSpPr>
+          <p:cNvPr id="4" name="TextBox 3"/>
+          <p:cNvSpPr txBox="1"/>
+          <p:nvPr/>
+        </p:nvSpPr>
+        <p:spPr>
+          <a:xfrm>
+            <a:off x="457200" y="914400"/>
+            <a:ext cx="8229600" cy="457200"/>
+          </a:xfrm>
+          <a:prstGeom prst="rect">
+            <a:avLst/>
+          </a:prstGeom>
+          <a:noFill/>
+        </p:spPr>
+        <p:txBody>
+          <a:bodyPr wrap="none">
+            <a:spAutoFit/>
+          </a:bodyPr>
+          <a:lstStyle/>
+          <a:p>
+            <a:pPr algn="ctr">
+              <a:defRPr sz="2000" b="1"/>
+            </a:pPr>
+            <a:r>
+              <a:t>CSV Import Interface</a:t>
+            </a:r>
+          </a:p>
+        </p:txBody>
+      </p:sp>
+      <p:sp>
+        <p:nvSpPr>
+          <p:cNvPr id="5" name="TextBox 4"/>
+          <p:cNvSpPr txBox="1"/>
+          <p:nvPr/>
+        </p:nvSpPr>
+        <p:spPr>
+          <a:xfrm>
+            <a:off x="640080" y="1554480"/>
+            <a:ext cx="7863840" cy="731520"/>
+          </a:xfrm>
+          <a:prstGeom prst="rect">
+            <a:avLst/>
+          </a:prstGeom>
+          <a:noFill/>
+        </p:spPr>
+        <p:txBody>
+          <a:bodyPr wrap="square">
+            <a:spAutoFit/>
+          </a:bodyPr>
+          <a:lstStyle/>
+          <a:p>
+            <a:pPr>
+              <a:defRPr sz="1200"/>
+            </a:pPr>
+            <a:r>
+              <a:t>Bulk import employee data and shift schedules from CSV files or Google Sheets.</a:t>
+            </a:r>
+          </a:p>
+        </p:txBody>
+      </p:sp>
+      <p:sp>
+        <p:nvSpPr>
+          <p:cNvPr id="6" name="TextBox 5"/>
+          <p:cNvSpPr txBox="1"/>
+          <p:nvPr/>
+        </p:nvSpPr>
+        <p:spPr>
+          <a:xfrm>
+            <a:off x="640080" y="2377440"/>
+            <a:ext cx="3749039" cy="3017520"/>
+          </a:xfrm>
+          <a:prstGeom prst="rect">
+            <a:avLst/>
+          </a:prstGeom>
+          <a:noFill/>
+        </p:spPr>
+        <p:txBody>
+          <a:bodyPr wrap="square">
+            <a:spAutoFit/>
+          </a:bodyPr>
+          <a:lstStyle/>
+          <a:p>
+            <a:pPr>
+              <a:spcAft>
+                <a:spcPts val="600"/>
+              </a:spcAft>
+              <a:defRPr sz="1100" b="1"/>
+            </a:pPr>
+            <a:r>
+              <a:t>Key Features:</a:t>
+            </a:r>
+          </a:p>
+          <a:p>
+            <a:pPr>
+              <a:spcAft>
+                <a:spcPts val="300"/>
+              </a:spcAft>
+              <a:defRPr sz="1000"/>
+            </a:pPr>
+            <a:r>
+              <a:t>• Upload CSV files with roster data</a:t>
+            </a:r>
+          </a:p>
+          <a:p>
+            <a:pPr>
+              <a:spcAft>
+                <a:spcPts val="300"/>
+              </a:spcAft>
+              <a:defRPr sz="1000"/>
+            </a:pPr>
+            <a:r>
+              <a:t>• Preview imported data before saving</a:t>
+            </a:r>
+          </a:p>
+          <a:p>
+            <a:pPr>
+              <a:spcAft>
+                <a:spcPts val="300"/>
+              </a:spcAft>
+              <a:defRPr sz="1000"/>
+            </a:pPr>
+            <a:r>
+              <a:t>• Automatic employee creation from imports</a:t>
+            </a:r>
+          </a:p>
+          <a:p>
+            <a:pPr>
+              <a:spcAft>
+                <a:spcPts val="300"/>
+              </a:spcAft>
+              <a:defRPr sz="1000"/>
+            </a:pPr>
+            <a:r>
+              <a:t>• Google Sheets synchronization</a:t>
+            </a:r>
+          </a:p>
+          <a:p>
+            <a:pPr>
+              <a:spcAft>
+                <a:spcPts val="300"/>
+              </a:spcAft>
+              <a:defRPr sz="1000"/>
+            </a:pPr>
+            <a:r>
+              <a:t>• Error validation and reporting</a:t>
+            </a:r>
+          </a:p>
+        </p:txBody>
+      </p:sp>
+      <p:sp>
+        <p:nvSpPr>
+          <p:cNvPr id="7" name="TextBox 6"/>
+          <p:cNvSpPr txBox="1"/>
+          <p:nvPr/>
+        </p:nvSpPr>
+        <p:spPr>
+          <a:xfrm>
+            <a:off x="4572000" y="2377440"/>
+            <a:ext cx="4206240" cy="1371600"/>
+          </a:xfrm>
+          <a:prstGeom prst="rect">
+            <a:avLst/>
+          </a:prstGeom>
+          <a:noFill/>
+        </p:spPr>
+        <p:txBody>
+          <a:bodyPr wrap="square">
+            <a:spAutoFit/>
+          </a:bodyPr>
+          <a:lstStyle/>
+          <a:p>
+            <a:pPr>
+              <a:spcAft>
+                <a:spcPts val="600"/>
+              </a:spcAft>
+              <a:defRPr sz="1100" b="1"/>
+            </a:pPr>
+            <a:r>
+              <a:t>Access Information:</a:t>
+            </a:r>
+          </a:p>
+          <a:p>
+            <a:pPr>
+              <a:spcAft>
+                <a:spcPts val="300"/>
+              </a:spcAft>
+              <a:defRPr sz="900"/>
+            </a:pPr>
+            <a:r>
+              <a:t>URL: http://localhost:3000/techcorp/admin</a:t>
+            </a:r>
+            <a:br/>
+            <a:r>
+              <a:t>Navigate to: CSV Import tab</a:t>
+            </a:r>
+          </a:p>
+        </p:txBody>
+      </p:sp>
+      <p:sp>
+        <p:nvSpPr>
+          <p:cNvPr id="8" name="TextBox 7"/>
+          <p:cNvSpPr txBox="1"/>
+          <p:nvPr/>
+        </p:nvSpPr>
+        <p:spPr>
+          <a:xfrm>
+            <a:off x="4572000" y="3840480"/>
+            <a:ext cx="4206240" cy="1554480"/>
+          </a:xfrm>
+          <a:prstGeom prst="rect">
+            <a:avLst/>
+          </a:prstGeom>
+          <a:noFill/>
+        </p:spPr>
+        <p:txBody>
+          <a:bodyPr wrap="square">
+            <a:spAutoFit/>
+          </a:bodyPr>
+          <a:lstStyle/>
+          <a:p>
+            <a:pPr>
+              <a:spcAft>
+                <a:spcPts val="600"/>
+              </a:spcAft>
+              <a:defRPr sz="1100" b="1"/>
+            </a:pPr>
+            <a:r>
+              <a:t>How to Use:</a:t>
+            </a:r>
+          </a:p>
+          <a:p>
+            <a:pPr>
+              <a:spcAft>
+                <a:spcPts val="300"/>
+              </a:spcAft>
+              <a:defRPr sz="900"/>
+            </a:pPr>
+            <a:r>
+              <a:t>Click "CSV Import" tab. Choose file or paste Google Sheets URL. Review preview table. Click "Import Data" to apply changes to roster.</a:t>
+            </a:r>
+          </a:p>
+        </p:txBody>
+      </p:sp>
+      <p:sp>
+        <p:nvSpPr>
+          <p:cNvPr id="9" name="TextBox 8"/>
+          <p:cNvSpPr txBox="1"/>
+          <p:nvPr/>
+        </p:nvSpPr>
+        <p:spPr>
+          <a:xfrm>
+            <a:off x="640080" y="5760720"/>
+            <a:ext cx="7863840" cy="457200"/>
+          </a:xfrm>
+          <a:prstGeom prst="rect">
+            <a:avLst/>
+          </a:prstGeom>
+          <a:noFill/>
+        </p:spPr>
+        <p:txBody>
+          <a:bodyPr wrap="none">
+            <a:spAutoFit/>
+          </a:bodyPr>
+          <a:lstStyle/>
+          <a:p>
+            <a:pPr algn="ctr">
+              <a:defRPr sz="800" i="1"/>
+            </a:pPr>
+            <a:r>
+              <a:t>Note: This is a placeholder. Replace with actual screenshot after manual capture using credentials provided above.</a:t>
+            </a:r>
+          </a:p>
+        </p:txBody>
+      </p:sp>
+    </p:spTree>
+  </p:cSld>
+  <p:clrMapOvr>
+    <a:masterClrMapping/>
+  </p:clrMapOvr>
+</p:sld>
+</file>
+
+<file path=ppt/slides/slide21.xml><?xml version="1.0" encoding="utf-8"?>
+<p:sld xmlns:a="http://schemas.openxmlformats.org/drawingml/2006/main" xmlns:p="http://schemas.openxmlformats.org/presentationml/2006/main" xmlns:r="http://schemas.openxmlformats.org/officeDocument/2006/relationships">
+  <p:cSld>
+    <p:spTree>
+      <p:nvGrpSpPr>
+        <p:cNvPr id="1" name=""/>
+        <p:cNvGrpSpPr/>
+        <p:nvPr/>
+      </p:nvGrpSpPr>
+      <p:grpSpPr/>
+      <p:sp>
+        <p:nvSpPr>
+          <p:cNvPr id="2" name="Title 1"/>
+          <p:cNvSpPr>
+            <a:spLocks noGrp="1"/>
+          </p:cNvSpPr>
+          <p:nvPr>
+            <p:ph type="title"/>
+          </p:nvPr>
+        </p:nvSpPr>
+        <p:spPr/>
+        <p:txBody>
+          <a:bodyPr/>
+          <a:lstStyle/>
+          <a:p/>
+        </p:txBody>
+      </p:sp>
+      <p:sp>
+        <p:nvSpPr>
+          <p:cNvPr id="3" name="TextBox 2"/>
+          <p:cNvSpPr txBox="1"/>
+          <p:nvPr/>
+        </p:nvSpPr>
+        <p:spPr>
+          <a:xfrm>
+            <a:off x="457200" y="274320"/>
+            <a:ext cx="8229600" cy="548640"/>
+          </a:xfrm>
+          <a:prstGeom prst="rect">
+            <a:avLst/>
+          </a:prstGeom>
+          <a:noFill/>
+        </p:spPr>
+        <p:txBody>
+          <a:bodyPr wrap="none">
+            <a:spAutoFit/>
+          </a:bodyPr>
+          <a:lstStyle/>
+          <a:p>
+            <a:pPr algn="ctr">
+              <a:defRPr sz="2400" b="1">
+                <a:solidFill>
+                  <a:srgbClr val="DC3545"/>
+                </a:solidFill>
+              </a:defRPr>
+            </a:pPr>
+            <a:r>
+              <a:t>[SCREENSHOT PLACEHOLDER 5]</a:t>
+            </a:r>
+          </a:p>
+        </p:txBody>
+      </p:sp>
+      <p:sp>
+        <p:nvSpPr>
+          <p:cNvPr id="4" name="TextBox 3"/>
+          <p:cNvSpPr txBox="1"/>
+          <p:nvPr/>
+        </p:nvSpPr>
+        <p:spPr>
+          <a:xfrm>
+            <a:off x="457200" y="914400"/>
+            <a:ext cx="8229600" cy="457200"/>
+          </a:xfrm>
+          <a:prstGeom prst="rect">
+            <a:avLst/>
+          </a:prstGeom>
+          <a:noFill/>
+        </p:spPr>
+        <p:txBody>
+          <a:bodyPr wrap="none">
+            <a:spAutoFit/>
+          </a:bodyPr>
+          <a:lstStyle/>
+          <a:p>
+            <a:pPr algn="ctr">
+              <a:defRPr sz="2000" b="1"/>
+            </a:pPr>
+            <a:r>
+              <a:t>Schedule Change Requests</a:t>
+            </a:r>
+          </a:p>
+        </p:txBody>
+      </p:sp>
+      <p:sp>
+        <p:nvSpPr>
+          <p:cNvPr id="5" name="TextBox 4"/>
+          <p:cNvSpPr txBox="1"/>
+          <p:nvPr/>
+        </p:nvSpPr>
+        <p:spPr>
+          <a:xfrm>
+            <a:off x="640080" y="1554480"/>
+            <a:ext cx="7863840" cy="731520"/>
+          </a:xfrm>
+          <a:prstGeom prst="rect">
+            <a:avLst/>
+          </a:prstGeom>
+          <a:noFill/>
+        </p:spPr>
+        <p:txBody>
+          <a:bodyPr wrap="square">
+            <a:spAutoFit/>
+          </a:bodyPr>
+          <a:lstStyle/>
+          <a:p>
+            <a:pPr>
+              <a:defRPr sz="1200"/>
+            </a:pPr>
+            <a:r>
+              <a:t>Manage employee shift change and swap requests with approval workflow.</a:t>
+            </a:r>
+          </a:p>
+        </p:txBody>
+      </p:sp>
+      <p:sp>
+        <p:nvSpPr>
+          <p:cNvPr id="6" name="TextBox 5"/>
+          <p:cNvSpPr txBox="1"/>
+          <p:nvPr/>
+        </p:nvSpPr>
+        <p:spPr>
+          <a:xfrm>
+            <a:off x="640080" y="2377440"/>
+            <a:ext cx="3749039" cy="3017520"/>
+          </a:xfrm>
+          <a:prstGeom prst="rect">
+            <a:avLst/>
+          </a:prstGeom>
+          <a:noFill/>
+        </p:spPr>
+        <p:txBody>
+          <a:bodyPr wrap="square">
+            <a:spAutoFit/>
+          </a:bodyPr>
+          <a:lstStyle/>
+          <a:p>
+            <a:pPr>
+              <a:spcAft>
+                <a:spcPts val="600"/>
+              </a:spcAft>
+              <a:defRPr sz="1100" b="1"/>
+            </a:pPr>
+            <a:r>
+              <a:t>Key Features:</a:t>
+            </a:r>
+          </a:p>
+          <a:p>
+            <a:pPr>
+              <a:spcAft>
+                <a:spcPts val="300"/>
+              </a:spcAft>
+              <a:defRPr sz="1000"/>
+            </a:pPr>
+            <a:r>
+              <a:t>• View pending shift change requests</a:t>
+            </a:r>
+          </a:p>
+          <a:p>
+            <a:pPr>
+              <a:spcAft>
+                <a:spcPts val="300"/>
+              </a:spcAft>
+              <a:defRPr sz="1000"/>
+            </a:pPr>
+            <a:r>
+              <a:t>• Approve or reject requests with one click</a:t>
+            </a:r>
+          </a:p>
+          <a:p>
+            <a:pPr>
+              <a:spcAft>
+                <a:spcPts val="300"/>
+              </a:spcAft>
+              <a:defRPr sz="1000"/>
+            </a:pPr>
+            <a:r>
+              <a:t>• See request history and audit trail</a:t>
+            </a:r>
+          </a:p>
+          <a:p>
+            <a:pPr>
+              <a:spcAft>
+                <a:spcPts val="300"/>
+              </a:spcAft>
+              <a:defRPr sz="1000"/>
+            </a:pPr>
+            <a:r>
+              <a:t>• Filter requests by employee or date</a:t>
+            </a:r>
+          </a:p>
+          <a:p>
+            <a:pPr>
+              <a:spcAft>
+                <a:spcPts val="300"/>
+              </a:spcAft>
+              <a:defRPr sz="1000"/>
+            </a:pPr>
+            <a:r>
+              <a:t>• Add notes to request decisions</a:t>
+            </a:r>
+          </a:p>
+        </p:txBody>
+      </p:sp>
+      <p:sp>
+        <p:nvSpPr>
+          <p:cNvPr id="7" name="TextBox 6"/>
+          <p:cNvSpPr txBox="1"/>
+          <p:nvPr/>
+        </p:nvSpPr>
+        <p:spPr>
+          <a:xfrm>
+            <a:off x="4572000" y="2377440"/>
+            <a:ext cx="4206240" cy="1371600"/>
+          </a:xfrm>
+          <a:prstGeom prst="rect">
+            <a:avLst/>
+          </a:prstGeom>
+          <a:noFill/>
+        </p:spPr>
+        <p:txBody>
+          <a:bodyPr wrap="square">
+            <a:spAutoFit/>
+          </a:bodyPr>
+          <a:lstStyle/>
+          <a:p>
+            <a:pPr>
+              <a:spcAft>
+                <a:spcPts val="600"/>
+              </a:spcAft>
+              <a:defRPr sz="1100" b="1"/>
+            </a:pPr>
+            <a:r>
+              <a:t>Access Information:</a:t>
+            </a:r>
+          </a:p>
+          <a:p>
+            <a:pPr>
+              <a:spcAft>
+                <a:spcPts val="300"/>
+              </a:spcAft>
+              <a:defRPr sz="900"/>
+            </a:pPr>
+            <a:r>
+              <a:t>URL: http://localhost:3000/techcorp/admin</a:t>
+            </a:r>
+            <a:br/>
+            <a:r>
+              <a:t>Navigate to: Schedule Requests tab</a:t>
+            </a:r>
+          </a:p>
+        </p:txBody>
+      </p:sp>
+      <p:sp>
+        <p:nvSpPr>
+          <p:cNvPr id="8" name="TextBox 7"/>
+          <p:cNvSpPr txBox="1"/>
+          <p:nvPr/>
+        </p:nvSpPr>
+        <p:spPr>
+          <a:xfrm>
+            <a:off x="4572000" y="3840480"/>
+            <a:ext cx="4206240" cy="1554480"/>
+          </a:xfrm>
+          <a:prstGeom prst="rect">
+            <a:avLst/>
+          </a:prstGeom>
+          <a:noFill/>
+        </p:spPr>
+        <p:txBody>
+          <a:bodyPr wrap="square">
+            <a:spAutoFit/>
+          </a:bodyPr>
+          <a:lstStyle/>
+          <a:p>
+            <a:pPr>
+              <a:spcAft>
+                <a:spcPts val="600"/>
+              </a:spcAft>
+              <a:defRPr sz="1100" b="1"/>
+            </a:pPr>
+            <a:r>
+              <a:t>How to Use:</a:t>
+            </a:r>
+          </a:p>
+          <a:p>
+            <a:pPr>
+              <a:spcAft>
+                <a:spcPts val="300"/>
+              </a:spcAft>
+              <a:defRPr sz="900"/>
+            </a:pPr>
+            <a:r>
+              <a:t>Click "Schedule Requests" tab. Review pending requests list. Click "Approve" or "Reject" for each request. View request details to see employee justification.</a:t>
+            </a:r>
+          </a:p>
+        </p:txBody>
+      </p:sp>
+      <p:sp>
+        <p:nvSpPr>
+          <p:cNvPr id="9" name="TextBox 8"/>
+          <p:cNvSpPr txBox="1"/>
+          <p:nvPr/>
+        </p:nvSpPr>
+        <p:spPr>
+          <a:xfrm>
+            <a:off x="640080" y="5760720"/>
+            <a:ext cx="7863840" cy="457200"/>
+          </a:xfrm>
+          <a:prstGeom prst="rect">
+            <a:avLst/>
+          </a:prstGeom>
+          <a:noFill/>
+        </p:spPr>
+        <p:txBody>
+          <a:bodyPr wrap="none">
+            <a:spAutoFit/>
+          </a:bodyPr>
+          <a:lstStyle/>
+          <a:p>
+            <a:pPr algn="ctr">
+              <a:defRPr sz="800" i="1"/>
+            </a:pPr>
+            <a:r>
+              <a:t>Note: This is a placeholder. Replace with actual screenshot after manual capture using credentials provided above.</a:t>
+            </a:r>
+          </a:p>
+        </p:txBody>
+      </p:sp>
+    </p:spTree>
+  </p:cSld>
+  <p:clrMapOvr>
+    <a:masterClrMapping/>
+  </p:clrMapOvr>
+</p:sld>
+</file>
+
+<file path=ppt/slides/slide22.xml><?xml version="1.0" encoding="utf-8"?>
+<p:sld xmlns:a="http://schemas.openxmlformats.org/drawingml/2006/main" xmlns:p="http://schemas.openxmlformats.org/presentationml/2006/main" xmlns:r="http://schemas.openxmlformats.org/officeDocument/2006/relationships">
+  <p:cSld>
+    <p:spTree>
+      <p:nvGrpSpPr>
+        <p:cNvPr id="1" name=""/>
+        <p:cNvGrpSpPr/>
+        <p:nvPr/>
+      </p:nvGrpSpPr>
+      <p:grpSpPr/>
+      <p:sp>
+        <p:nvSpPr>
+          <p:cNvPr id="2" name="Title 1"/>
+          <p:cNvSpPr>
+            <a:spLocks noGrp="1"/>
+          </p:cNvSpPr>
+          <p:nvPr>
+            <p:ph type="title"/>
+          </p:nvPr>
+        </p:nvSpPr>
+        <p:spPr/>
+        <p:txBody>
+          <a:bodyPr/>
+          <a:lstStyle/>
+          <a:p/>
+        </p:txBody>
+      </p:sp>
+      <p:sp>
+        <p:nvSpPr>
+          <p:cNvPr id="3" name="TextBox 2"/>
+          <p:cNvSpPr txBox="1"/>
+          <p:nvPr/>
+        </p:nvSpPr>
+        <p:spPr>
+          <a:xfrm>
+            <a:off x="457200" y="274320"/>
+            <a:ext cx="8229600" cy="548640"/>
+          </a:xfrm>
+          <a:prstGeom prst="rect">
+            <a:avLst/>
+          </a:prstGeom>
+          <a:noFill/>
+        </p:spPr>
+        <p:txBody>
+          <a:bodyPr wrap="none">
+            <a:spAutoFit/>
+          </a:bodyPr>
+          <a:lstStyle/>
+          <a:p>
+            <a:pPr algn="ctr">
+              <a:defRPr sz="2400" b="1">
+                <a:solidFill>
+                  <a:srgbClr val="DC3545"/>
+                </a:solidFill>
+              </a:defRPr>
+            </a:pPr>
+            <a:r>
+              <a:t>[SCREENSHOT PLACEHOLDER 6]</a:t>
+            </a:r>
+          </a:p>
+        </p:txBody>
+      </p:sp>
+      <p:sp>
+        <p:nvSpPr>
+          <p:cNvPr id="4" name="TextBox 3"/>
+          <p:cNvSpPr txBox="1"/>
+          <p:nvPr/>
+        </p:nvSpPr>
+        <p:spPr>
+          <a:xfrm>
+            <a:off x="457200" y="914400"/>
+            <a:ext cx="8229600" cy="457200"/>
+          </a:xfrm>
+          <a:prstGeom prst="rect">
+            <a:avLst/>
+          </a:prstGeom>
+          <a:noFill/>
+        </p:spPr>
+        <p:txBody>
+          <a:bodyPr wrap="none">
+            <a:spAutoFit/>
+          </a:bodyPr>
+          <a:lstStyle/>
+          <a:p>
+            <a:pPr algn="ctr">
+              <a:defRPr sz="2000" b="1"/>
+            </a:pPr>
+            <a:r>
+              <a:t>Employee Portal Dashboard</a:t>
+            </a:r>
+          </a:p>
+        </p:txBody>
+      </p:sp>
+      <p:sp>
+        <p:nvSpPr>
+          <p:cNvPr id="5" name="TextBox 4"/>
+          <p:cNvSpPr txBox="1"/>
+          <p:nvPr/>
+        </p:nvSpPr>
+        <p:spPr>
+          <a:xfrm>
+            <a:off x="640080" y="1554480"/>
+            <a:ext cx="7863840" cy="731520"/>
+          </a:xfrm>
+          <a:prstGeom prst="rect">
+            <a:avLst/>
+          </a:prstGeom>
+          <a:noFill/>
+        </p:spPr>
+        <p:txBody>
+          <a:bodyPr wrap="square">
+            <a:spAutoFit/>
+          </a:bodyPr>
+          <a:lstStyle/>
+          <a:p>
+            <a:pPr>
+              <a:defRPr sz="1200"/>
+            </a:pPr>
+            <a:r>
+              <a:t>Employee self-service portal for viewing schedules and submitting requests.</a:t>
+            </a:r>
+          </a:p>
+        </p:txBody>
+      </p:sp>
+      <p:sp>
+        <p:nvSpPr>
+          <p:cNvPr id="6" name="TextBox 5"/>
+          <p:cNvSpPr txBox="1"/>
+          <p:nvPr/>
+        </p:nvSpPr>
+        <p:spPr>
+          <a:xfrm>
+            <a:off x="640080" y="2377440"/>
+            <a:ext cx="3749039" cy="3017520"/>
+          </a:xfrm>
+          <a:prstGeom prst="rect">
+            <a:avLst/>
+          </a:prstGeom>
+          <a:noFill/>
+        </p:spPr>
+        <p:txBody>
+          <a:bodyPr wrap="square">
+            <a:spAutoFit/>
+          </a:bodyPr>
+          <a:lstStyle/>
+          <a:p>
+            <a:pPr>
+              <a:spcAft>
+                <a:spcPts val="600"/>
+              </a:spcAft>
+              <a:defRPr sz="1100" b="1"/>
+            </a:pPr>
+            <a:r>
+              <a:t>Key Features:</a:t>
+            </a:r>
+          </a:p>
+          <a:p>
+            <a:pPr>
+              <a:spcAft>
+                <a:spcPts val="300"/>
+              </a:spcAft>
+              <a:defRPr sz="1000"/>
+            </a:pPr>
+            <a:r>
+              <a:t>• View personal shift schedule</a:t>
+            </a:r>
+          </a:p>
+          <a:p>
+            <a:pPr>
+              <a:spcAft>
+                <a:spcPts val="300"/>
+              </a:spcAft>
+              <a:defRPr sz="1000"/>
+            </a:pPr>
+            <a:r>
+              <a:t>• See upcoming shifts and day-off</a:t>
+            </a:r>
+          </a:p>
+          <a:p>
+            <a:pPr>
+              <a:spcAft>
+                <a:spcPts val="300"/>
+              </a:spcAft>
+              <a:defRPr sz="1000"/>
+            </a:pPr>
+            <a:r>
+              <a:t>• Submit shift change requests</a:t>
+            </a:r>
+          </a:p>
+          <a:p>
+            <a:pPr>
+              <a:spcAft>
+                <a:spcPts val="300"/>
+              </a:spcAft>
+              <a:defRPr sz="1000"/>
+            </a:pPr>
+            <a:r>
+              <a:t>• View request status and history</a:t>
+            </a:r>
+          </a:p>
+          <a:p>
+            <a:pPr>
+              <a:spcAft>
+                <a:spcPts val="300"/>
+              </a:spcAft>
+              <a:defRPr sz="1000"/>
+            </a:pPr>
+            <a:r>
+              <a:t>• Access team schedule information</a:t>
+            </a:r>
+          </a:p>
+        </p:txBody>
+      </p:sp>
+      <p:sp>
+        <p:nvSpPr>
+          <p:cNvPr id="7" name="TextBox 6"/>
+          <p:cNvSpPr txBox="1"/>
+          <p:nvPr/>
+        </p:nvSpPr>
+        <p:spPr>
+          <a:xfrm>
+            <a:off x="4572000" y="2377440"/>
+            <a:ext cx="4206240" cy="1371600"/>
+          </a:xfrm>
+          <a:prstGeom prst="rect">
+            <a:avLst/>
+          </a:prstGeom>
+          <a:noFill/>
+        </p:spPr>
+        <p:txBody>
+          <a:bodyPr wrap="square">
+            <a:spAutoFit/>
+          </a:bodyPr>
+          <a:lstStyle/>
+          <a:p>
+            <a:pPr>
+              <a:spcAft>
+                <a:spcPts val="600"/>
+              </a:spcAft>
+              <a:defRPr sz="1100" b="1"/>
+            </a:pPr>
+            <a:r>
+              <a:t>Access Information:</a:t>
+            </a:r>
+          </a:p>
+          <a:p>
+            <a:pPr>
+              <a:spcAft>
+                <a:spcPts val="300"/>
+              </a:spcAft>
+              <a:defRPr sz="900"/>
+            </a:pPr>
+            <a:r>
+              <a:t>URL: http://localhost:3000/techcorp/employee</a:t>
+            </a:r>
+            <a:br/>
+            <a:r>
+              <a:t>Login: EMP001 / pass123</a:t>
+            </a:r>
+          </a:p>
+        </p:txBody>
+      </p:sp>
+      <p:sp>
+        <p:nvSpPr>
+          <p:cNvPr id="8" name="TextBox 7"/>
+          <p:cNvSpPr txBox="1"/>
+          <p:nvPr/>
+        </p:nvSpPr>
+        <p:spPr>
+          <a:xfrm>
+            <a:off x="4572000" y="3840480"/>
+            <a:ext cx="4206240" cy="1554480"/>
+          </a:xfrm>
+          <a:prstGeom prst="rect">
+            <a:avLst/>
+          </a:prstGeom>
+          <a:noFill/>
+        </p:spPr>
+        <p:txBody>
+          <a:bodyPr wrap="square">
+            <a:spAutoFit/>
+          </a:bodyPr>
+          <a:lstStyle/>
+          <a:p>
+            <a:pPr>
+              <a:spcAft>
+                <a:spcPts val="600"/>
+              </a:spcAft>
+              <a:defRPr sz="1100" b="1"/>
+            </a:pPr>
+            <a:r>
+              <a:t>How to Use:</a:t>
+            </a:r>
+          </a:p>
+          <a:p>
+            <a:pPr>
+              <a:spcAft>
+                <a:spcPts val="300"/>
+              </a:spcAft>
+              <a:defRPr sz="900"/>
+            </a:pPr>
+            <a:r>
+              <a:t>Login with employee credentials. Dashboard shows today's and upcoming shifts. Click "Request Change" to submit shift modification requests.</a:t>
+            </a:r>
+          </a:p>
+        </p:txBody>
+      </p:sp>
+      <p:sp>
+        <p:nvSpPr>
+          <p:cNvPr id="9" name="TextBox 8"/>
+          <p:cNvSpPr txBox="1"/>
+          <p:nvPr/>
+        </p:nvSpPr>
+        <p:spPr>
+          <a:xfrm>
+            <a:off x="640080" y="5760720"/>
+            <a:ext cx="7863840" cy="457200"/>
+          </a:xfrm>
+          <a:prstGeom prst="rect">
+            <a:avLst/>
+          </a:prstGeom>
+          <a:noFill/>
+        </p:spPr>
+        <p:txBody>
+          <a:bodyPr wrap="none">
+            <a:spAutoFit/>
+          </a:bodyPr>
+          <a:lstStyle/>
+          <a:p>
+            <a:pPr algn="ctr">
+              <a:defRPr sz="800" i="1"/>
+            </a:pPr>
+            <a:r>
+              <a:t>Note: This is a placeholder. Replace with actual screenshot after manual capture using credentials provided above.</a:t>
+            </a:r>
+          </a:p>
+        </p:txBody>
+      </p:sp>
+    </p:spTree>
+  </p:cSld>
+  <p:clrMapOvr>
+    <a:masterClrMapping/>
+  </p:clrMapOvr>
+</p:sld>
+</file>
+
+<file path=ppt/slides/slide23.xml><?xml version="1.0" encoding="utf-8"?>
+<p:sld xmlns:a="http://schemas.openxmlformats.org/drawingml/2006/main" xmlns:p="http://schemas.openxmlformats.org/presentationml/2006/main" xmlns:r="http://schemas.openxmlformats.org/officeDocument/2006/relationships">
+  <p:cSld>
+    <p:spTree>
+      <p:nvGrpSpPr>
+        <p:cNvPr id="1" name=""/>
+        <p:cNvGrpSpPr/>
+        <p:nvPr/>
+      </p:nvGrpSpPr>
+      <p:grpSpPr/>
+      <p:sp>
+        <p:nvSpPr>
+          <p:cNvPr id="2" name="Title 1"/>
+          <p:cNvSpPr>
+            <a:spLocks noGrp="1"/>
+          </p:cNvSpPr>
+          <p:nvPr>
+            <p:ph type="title"/>
+          </p:nvPr>
+        </p:nvSpPr>
+        <p:spPr/>
+        <p:txBody>
+          <a:bodyPr/>
+          <a:lstStyle/>
+          <a:p/>
+        </p:txBody>
+      </p:sp>
+      <p:sp>
+        <p:nvSpPr>
+          <p:cNvPr id="3" name="TextBox 2"/>
+          <p:cNvSpPr txBox="1"/>
+          <p:nvPr/>
+        </p:nvSpPr>
+        <p:spPr>
+          <a:xfrm>
+            <a:off x="457200" y="274320"/>
+            <a:ext cx="8229600" cy="548640"/>
+          </a:xfrm>
+          <a:prstGeom prst="rect">
+            <a:avLst/>
+          </a:prstGeom>
+          <a:noFill/>
+        </p:spPr>
+        <p:txBody>
+          <a:bodyPr wrap="none">
+            <a:spAutoFit/>
+          </a:bodyPr>
+          <a:lstStyle/>
+          <a:p>
+            <a:pPr algn="ctr">
+              <a:defRPr sz="2400" b="1">
+                <a:solidFill>
+                  <a:srgbClr val="DC3545"/>
+                </a:solidFill>
+              </a:defRPr>
+            </a:pPr>
+            <a:r>
+              <a:t>[SCREENSHOT PLACEHOLDER 7]</a:t>
+            </a:r>
+          </a:p>
+        </p:txBody>
+      </p:sp>
+      <p:sp>
+        <p:nvSpPr>
+          <p:cNvPr id="4" name="TextBox 3"/>
+          <p:cNvSpPr txBox="1"/>
+          <p:nvPr/>
+        </p:nvSpPr>
+        <p:spPr>
+          <a:xfrm>
+            <a:off x="457200" y="914400"/>
+            <a:ext cx="8229600" cy="457200"/>
+          </a:xfrm>
+          <a:prstGeom prst="rect">
+            <a:avLst/>
+          </a:prstGeom>
+          <a:noFill/>
+        </p:spPr>
+        <p:txBody>
+          <a:bodyPr wrap="none">
+            <a:spAutoFit/>
+          </a:bodyPr>
+          <a:lstStyle/>
+          <a:p>
+            <a:pPr algn="ctr">
+              <a:defRPr sz="2000" b="1"/>
+            </a:pPr>
+            <a:r>
+              <a:t>Employee Schedule Calendar</a:t>
+            </a:r>
+          </a:p>
+        </p:txBody>
+      </p:sp>
+      <p:sp>
+        <p:nvSpPr>
+          <p:cNvPr id="5" name="TextBox 4"/>
+          <p:cNvSpPr txBox="1"/>
+          <p:nvPr/>
+        </p:nvSpPr>
+        <p:spPr>
+          <a:xfrm>
+            <a:off x="640080" y="1554480"/>
+            <a:ext cx="7863840" cy="731520"/>
+          </a:xfrm>
+          <a:prstGeom prst="rect">
+            <a:avLst/>
+          </a:prstGeom>
+          <a:noFill/>
+        </p:spPr>
+        <p:txBody>
+          <a:bodyPr wrap="square">
+            <a:spAutoFit/>
+          </a:bodyPr>
+          <a:lstStyle/>
+          <a:p>
+            <a:pPr>
+              <a:defRPr sz="1200"/>
+            </a:pPr>
+            <a:r>
+              <a:t>Personal calendar view showing employee's assigned shifts and team schedules.</a:t>
+            </a:r>
+          </a:p>
+        </p:txBody>
+      </p:sp>
+      <p:sp>
+        <p:nvSpPr>
+          <p:cNvPr id="6" name="TextBox 5"/>
+          <p:cNvSpPr txBox="1"/>
+          <p:nvPr/>
+        </p:nvSpPr>
+        <p:spPr>
+          <a:xfrm>
+            <a:off x="640080" y="2377440"/>
+            <a:ext cx="3749039" cy="3017520"/>
+          </a:xfrm>
+          <a:prstGeom prst="rect">
+            <a:avLst/>
+          </a:prstGeom>
+          <a:noFill/>
+        </p:spPr>
+        <p:txBody>
+          <a:bodyPr wrap="square">
+            <a:spAutoFit/>
+          </a:bodyPr>
+          <a:lstStyle/>
+          <a:p>
+            <a:pPr>
+              <a:spcAft>
+                <a:spcPts val="600"/>
+              </a:spcAft>
+              <a:defRPr sz="1100" b="1"/>
+            </a:pPr>
+            <a:r>
+              <a:t>Key Features:</a:t>
+            </a:r>
+          </a:p>
+          <a:p>
+            <a:pPr>
+              <a:spcAft>
+                <a:spcPts val="300"/>
+              </a:spcAft>
+              <a:defRPr sz="1000"/>
+            </a:pPr>
+            <a:r>
+              <a:t>• Month and week calendar views</a:t>
+            </a:r>
+          </a:p>
+          <a:p>
+            <a:pPr>
+              <a:spcAft>
+                <a:spcPts val="300"/>
+              </a:spcAft>
+              <a:defRPr sz="1000"/>
+            </a:pPr>
+            <a:r>
+              <a:t>• Color-coded shift indicators</a:t>
+            </a:r>
+          </a:p>
+          <a:p>
+            <a:pPr>
+              <a:spcAft>
+                <a:spcPts val="300"/>
+              </a:spcAft>
+              <a:defRPr sz="1000"/>
+            </a:pPr>
+            <a:r>
+              <a:t>• Shift time and location details</a:t>
+            </a:r>
+          </a:p>
+          <a:p>
+            <a:pPr>
+              <a:spcAft>
+                <a:spcPts val="300"/>
+              </a:spcAft>
+              <a:defRPr sz="1000"/>
+            </a:pPr>
+            <a:r>
+              <a:t>• Team member availability view</a:t>
+            </a:r>
+          </a:p>
+          <a:p>
+            <a:pPr>
+              <a:spcAft>
+                <a:spcPts val="300"/>
+              </a:spcAft>
+              <a:defRPr sz="1000"/>
+            </a:pPr>
+            <a:r>
+              <a:t>• Export schedule to calendar apps</a:t>
+            </a:r>
+          </a:p>
+        </p:txBody>
+      </p:sp>
+      <p:sp>
+        <p:nvSpPr>
+          <p:cNvPr id="7" name="TextBox 6"/>
+          <p:cNvSpPr txBox="1"/>
+          <p:nvPr/>
+        </p:nvSpPr>
+        <p:spPr>
+          <a:xfrm>
+            <a:off x="4572000" y="2377440"/>
+            <a:ext cx="4206240" cy="1371600"/>
+          </a:xfrm>
+          <a:prstGeom prst="rect">
+            <a:avLst/>
+          </a:prstGeom>
+          <a:noFill/>
+        </p:spPr>
+        <p:txBody>
+          <a:bodyPr wrap="square">
+            <a:spAutoFit/>
+          </a:bodyPr>
+          <a:lstStyle/>
+          <a:p>
+            <a:pPr>
+              <a:spcAft>
+                <a:spcPts val="600"/>
+              </a:spcAft>
+              <a:defRPr sz="1100" b="1"/>
+            </a:pPr>
+            <a:r>
+              <a:t>Access Information:</a:t>
+            </a:r>
+          </a:p>
+          <a:p>
+            <a:pPr>
+              <a:spcAft>
+                <a:spcPts val="300"/>
+              </a:spcAft>
+              <a:defRPr sz="900"/>
+            </a:pPr>
+            <a:r>
+              <a:t>URL: http://localhost:3000/techcorp/employee</a:t>
+            </a:r>
+            <a:br/>
+            <a:r>
+              <a:t>Navigate to: My Schedule section</a:t>
+            </a:r>
+          </a:p>
+        </p:txBody>
+      </p:sp>
+      <p:sp>
+        <p:nvSpPr>
+          <p:cNvPr id="8" name="TextBox 7"/>
+          <p:cNvSpPr txBox="1"/>
+          <p:nvPr/>
+        </p:nvSpPr>
+        <p:spPr>
+          <a:xfrm>
+            <a:off x="4572000" y="3840480"/>
+            <a:ext cx="4206240" cy="1554480"/>
+          </a:xfrm>
+          <a:prstGeom prst="rect">
+            <a:avLst/>
+          </a:prstGeom>
+          <a:noFill/>
+        </p:spPr>
+        <p:txBody>
+          <a:bodyPr wrap="square">
+            <a:spAutoFit/>
+          </a:bodyPr>
+          <a:lstStyle/>
+          <a:p>
+            <a:pPr>
+              <a:spcAft>
+                <a:spcPts val="600"/>
+              </a:spcAft>
+              <a:defRPr sz="1100" b="1"/>
+            </a:pPr>
+            <a:r>
+              <a:t>How to Use:</a:t>
+            </a:r>
+          </a:p>
+          <a:p>
+            <a:pPr>
+              <a:spcAft>
+                <a:spcPts val="300"/>
+              </a:spcAft>
+              <a:defRPr sz="900"/>
+            </a:pPr>
+            <a:r>
+              <a:t>Click "My Schedule" in employee menu. Navigate between months using calendar controls. Click any shift to see full details and submit change requests.</a:t>
+            </a:r>
+          </a:p>
+        </p:txBody>
+      </p:sp>
+      <p:sp>
+        <p:nvSpPr>
+          <p:cNvPr id="9" name="TextBox 8"/>
+          <p:cNvSpPr txBox="1"/>
+          <p:nvPr/>
+        </p:nvSpPr>
+        <p:spPr>
+          <a:xfrm>
+            <a:off x="640080" y="5760720"/>
+            <a:ext cx="7863840" cy="457200"/>
+          </a:xfrm>
+          <a:prstGeom prst="rect">
+            <a:avLst/>
+          </a:prstGeom>
+          <a:noFill/>
+        </p:spPr>
+        <p:txBody>
+          <a:bodyPr wrap="none">
+            <a:spAutoFit/>
+          </a:bodyPr>
+          <a:lstStyle/>
+          <a:p>
+            <a:pPr algn="ctr">
+              <a:defRPr sz="800" i="1"/>
+            </a:pPr>
+            <a:r>
+              <a:t>Note: This is a placeholder. Replace with actual screenshot after manual capture using credentials provided above.</a:t>
+            </a:r>
+          </a:p>
+        </p:txBody>
+      </p:sp>
+    </p:spTree>
+  </p:cSld>
+  <p:clrMapOvr>
+    <a:masterClrMapping/>
+  </p:clrMapOvr>
+</p:sld>
+</file>
+
+<file path=ppt/slides/slide24.xml><?xml version="1.0" encoding="utf-8"?>
+<p:sld xmlns:a="http://schemas.openxmlformats.org/drawingml/2006/main" xmlns:p="http://schemas.openxmlformats.org/presentationml/2006/main" xmlns:r="http://schemas.openxmlformats.org/officeDocument/2006/relationships">
+  <p:cSld>
+    <p:spTree>
+      <p:nvGrpSpPr>
+        <p:cNvPr id="1" name=""/>
+        <p:cNvGrpSpPr/>
+        <p:nvPr/>
+      </p:nvGrpSpPr>
+      <p:grpSpPr/>
+      <p:sp>
+        <p:nvSpPr>
+          <p:cNvPr id="2" name="Title 1"/>
+          <p:cNvSpPr>
+            <a:spLocks noGrp="1"/>
+          </p:cNvSpPr>
+          <p:nvPr>
+            <p:ph type="title"/>
+          </p:nvPr>
+        </p:nvSpPr>
+        <p:spPr/>
+        <p:txBody>
+          <a:bodyPr/>
+          <a:lstStyle/>
+          <a:p/>
+        </p:txBody>
+      </p:sp>
+      <p:sp>
+        <p:nvSpPr>
+          <p:cNvPr id="3" name="TextBox 2"/>
+          <p:cNvSpPr txBox="1"/>
+          <p:nvPr/>
+        </p:nvSpPr>
+        <p:spPr>
+          <a:xfrm>
+            <a:off x="457200" y="274320"/>
+            <a:ext cx="8229600" cy="548640"/>
+          </a:xfrm>
+          <a:prstGeom prst="rect">
+            <a:avLst/>
+          </a:prstGeom>
+          <a:noFill/>
+        </p:spPr>
+        <p:txBody>
+          <a:bodyPr wrap="none">
+            <a:spAutoFit/>
+          </a:bodyPr>
+          <a:lstStyle/>
+          <a:p>
+            <a:pPr algn="ctr">
+              <a:defRPr sz="2400" b="1">
+                <a:solidFill>
+                  <a:srgbClr val="DC3545"/>
+                </a:solidFill>
+              </a:defRPr>
+            </a:pPr>
+            <a:r>
+              <a:t>[SCREENSHOT PLACEHOLDER 8]</a:t>
+            </a:r>
+          </a:p>
+        </p:txBody>
+      </p:sp>
+      <p:sp>
+        <p:nvSpPr>
+          <p:cNvPr id="4" name="TextBox 3"/>
+          <p:cNvSpPr txBox="1"/>
+          <p:nvPr/>
+        </p:nvSpPr>
+        <p:spPr>
+          <a:xfrm>
+            <a:off x="457200" y="914400"/>
+            <a:ext cx="8229600" cy="457200"/>
+          </a:xfrm>
+          <a:prstGeom prst="rect">
+            <a:avLst/>
+          </a:prstGeom>
+          <a:noFill/>
+        </p:spPr>
+        <p:txBody>
+          <a:bodyPr wrap="none">
+            <a:spAutoFit/>
+          </a:bodyPr>
+          <a:lstStyle/>
+          <a:p>
+            <a:pPr algn="ctr">
+              <a:defRPr sz="2000" b="1"/>
+            </a:pPr>
+            <a:r>
+              <a:t>Team Schedule View</a:t>
+            </a:r>
+          </a:p>
+        </p:txBody>
+      </p:sp>
+      <p:sp>
+        <p:nvSpPr>
+          <p:cNvPr id="5" name="TextBox 4"/>
+          <p:cNvSpPr txBox="1"/>
+          <p:nvPr/>
+        </p:nvSpPr>
+        <p:spPr>
+          <a:xfrm>
+            <a:off x="640080" y="1554480"/>
+            <a:ext cx="7863840" cy="731520"/>
+          </a:xfrm>
+          <a:prstGeom prst="rect">
+            <a:avLst/>
+          </a:prstGeom>
+          <a:noFill/>
+        </p:spPr>
+        <p:txBody>
+          <a:bodyPr wrap="square">
+            <a:spAutoFit/>
+          </a:bodyPr>
+          <a:lstStyle/>
+          <a:p>
+            <a:pPr>
+              <a:defRPr sz="1200"/>
+            </a:pPr>
+            <a:r>
+              <a:t>View schedules of team members to coordinate shift coverage and swap requests.</a:t>
+            </a:r>
+          </a:p>
+        </p:txBody>
+      </p:sp>
+      <p:sp>
+        <p:nvSpPr>
+          <p:cNvPr id="6" name="TextBox 5"/>
+          <p:cNvSpPr txBox="1"/>
+          <p:nvPr/>
+        </p:nvSpPr>
+        <p:spPr>
+          <a:xfrm>
+            <a:off x="640080" y="2377440"/>
+            <a:ext cx="3749039" cy="3017520"/>
+          </a:xfrm>
+          <a:prstGeom prst="rect">
+            <a:avLst/>
+          </a:prstGeom>
+          <a:noFill/>
+        </p:spPr>
+        <p:txBody>
+          <a:bodyPr wrap="square">
+            <a:spAutoFit/>
+          </a:bodyPr>
+          <a:lstStyle/>
+          <a:p>
+            <a:pPr>
+              <a:spcAft>
+                <a:spcPts val="600"/>
+              </a:spcAft>
+              <a:defRPr sz="1100" b="1"/>
+            </a:pPr>
+            <a:r>
+              <a:t>Key Features:</a:t>
+            </a:r>
+          </a:p>
+          <a:p>
+            <a:pPr>
+              <a:spcAft>
+                <a:spcPts val="300"/>
+              </a:spcAft>
+              <a:defRPr sz="1000"/>
+            </a:pPr>
+            <a:r>
+              <a:t>• See all team members' shifts</a:t>
+            </a:r>
+          </a:p>
+          <a:p>
+            <a:pPr>
+              <a:spcAft>
+                <a:spcPts val="300"/>
+              </a:spcAft>
+              <a:defRPr sz="1000"/>
+            </a:pPr>
+            <a:r>
+              <a:t>• Identify coverage gaps</a:t>
+            </a:r>
+          </a:p>
+          <a:p>
+            <a:pPr>
+              <a:spcAft>
+                <a:spcPts val="300"/>
+              </a:spcAft>
+              <a:defRPr sz="1000"/>
+            </a:pPr>
+            <a:r>
+              <a:t>• Find potential swap partners</a:t>
+            </a:r>
+          </a:p>
+          <a:p>
+            <a:pPr>
+              <a:spcAft>
+                <a:spcPts val="300"/>
+              </a:spcAft>
+              <a:defRPr sz="1000"/>
+            </a:pPr>
+            <a:r>
+              <a:t>• Team availability overview</a:t>
+            </a:r>
+          </a:p>
+          <a:p>
+            <a:pPr>
+              <a:spcAft>
+                <a:spcPts val="300"/>
+              </a:spcAft>
+              <a:defRPr sz="1000"/>
+            </a:pPr>
+            <a:r>
+              <a:t>• Contact team members directly</a:t>
+            </a:r>
+          </a:p>
+        </p:txBody>
+      </p:sp>
+      <p:sp>
+        <p:nvSpPr>
+          <p:cNvPr id="7" name="TextBox 6"/>
+          <p:cNvSpPr txBox="1"/>
+          <p:nvPr/>
+        </p:nvSpPr>
+        <p:spPr>
+          <a:xfrm>
+            <a:off x="4572000" y="2377440"/>
+            <a:ext cx="4206240" cy="1371600"/>
+          </a:xfrm>
+          <a:prstGeom prst="rect">
+            <a:avLst/>
+          </a:prstGeom>
+          <a:noFill/>
+        </p:spPr>
+        <p:txBody>
+          <a:bodyPr wrap="square">
+            <a:spAutoFit/>
+          </a:bodyPr>
+          <a:lstStyle/>
+          <a:p>
+            <a:pPr>
+              <a:spcAft>
+                <a:spcPts val="600"/>
+              </a:spcAft>
+              <a:defRPr sz="1100" b="1"/>
+            </a:pPr>
+            <a:r>
+              <a:t>Access Information:</a:t>
+            </a:r>
+          </a:p>
+          <a:p>
+            <a:pPr>
+              <a:spcAft>
+                <a:spcPts val="300"/>
+              </a:spcAft>
+              <a:defRPr sz="900"/>
+            </a:pPr>
+            <a:r>
+              <a:t>URL: http://localhost:3000/techcorp/employee</a:t>
+            </a:r>
+            <a:br/>
+            <a:r>
+              <a:t>Navigate to: Team section</a:t>
+            </a:r>
+          </a:p>
+        </p:txBody>
+      </p:sp>
+      <p:sp>
+        <p:nvSpPr>
+          <p:cNvPr id="8" name="TextBox 7"/>
+          <p:cNvSpPr txBox="1"/>
+          <p:nvPr/>
+        </p:nvSpPr>
+        <p:spPr>
+          <a:xfrm>
+            <a:off x="4572000" y="3840480"/>
+            <a:ext cx="4206240" cy="1554480"/>
+          </a:xfrm>
+          <a:prstGeom prst="rect">
+            <a:avLst/>
+          </a:prstGeom>
+          <a:noFill/>
+        </p:spPr>
+        <p:txBody>
+          <a:bodyPr wrap="square">
+            <a:spAutoFit/>
+          </a:bodyPr>
+          <a:lstStyle/>
+          <a:p>
+            <a:pPr>
+              <a:spcAft>
+                <a:spcPts val="600"/>
+              </a:spcAft>
+              <a:defRPr sz="1100" b="1"/>
+            </a:pPr>
+            <a:r>
+              <a:t>How to Use:</a:t>
+            </a:r>
+          </a:p>
+          <a:p>
+            <a:pPr>
+              <a:spcAft>
+                <a:spcPts val="300"/>
+              </a:spcAft>
+              <a:defRPr sz="900"/>
+            </a:pPr>
+            <a:r>
+              <a:t>Click "Team" in employee menu. View colleague schedules side-by-side. Click team member to view details or initiate shift swap request.</a:t>
+            </a:r>
+          </a:p>
+        </p:txBody>
+      </p:sp>
+      <p:sp>
+        <p:nvSpPr>
+          <p:cNvPr id="9" name="TextBox 8"/>
+          <p:cNvSpPr txBox="1"/>
+          <p:nvPr/>
+        </p:nvSpPr>
+        <p:spPr>
+          <a:xfrm>
+            <a:off x="640080" y="5760720"/>
+            <a:ext cx="7863840" cy="457200"/>
+          </a:xfrm>
+          <a:prstGeom prst="rect">
+            <a:avLst/>
+          </a:prstGeom>
+          <a:noFill/>
+        </p:spPr>
+        <p:txBody>
+          <a:bodyPr wrap="none">
+            <a:spAutoFit/>
+          </a:bodyPr>
+          <a:lstStyle/>
+          <a:p>
+            <a:pPr algn="ctr">
+              <a:defRPr sz="800" i="1"/>
+            </a:pPr>
+            <a:r>
+              <a:t>Note: This is a placeholder. Replace with actual screenshot after manual capture using credentials provided above.</a:t>
+            </a:r>
+          </a:p>
+        </p:txBody>
+      </p:sp>
+    </p:spTree>
+  </p:cSld>
+  <p:clrMapOvr>
+    <a:masterClrMapping/>
+  </p:clrMapOvr>
+</p:sld>
+</file>
+
+<file path=ppt/slides/slide25.xml><?xml version="1.0" encoding="utf-8"?>
+<p:sld xmlns:a="http://schemas.openxmlformats.org/drawingml/2006/main" xmlns:p="http://schemas.openxmlformats.org/presentationml/2006/main" xmlns:r="http://schemas.openxmlformats.org/officeDocument/2006/relationships">
+  <p:cSld>
+    <p:spTree>
+      <p:nvGrpSpPr>
+        <p:cNvPr id="1" name=""/>
+        <p:cNvGrpSpPr/>
+        <p:nvPr/>
+      </p:nvGrpSpPr>
+      <p:grpSpPr/>
+      <p:sp>
+        <p:nvSpPr>
+          <p:cNvPr id="2" name="Title 1"/>
+          <p:cNvSpPr>
+            <a:spLocks noGrp="1"/>
+          </p:cNvSpPr>
+          <p:nvPr>
+            <p:ph type="title"/>
+          </p:nvPr>
+        </p:nvSpPr>
+        <p:spPr/>
+        <p:txBody>
+          <a:bodyPr/>
+          <a:lstStyle/>
+          <a:p/>
+        </p:txBody>
+      </p:sp>
+      <p:sp>
+        <p:nvSpPr>
+          <p:cNvPr id="3" name="TextBox 2"/>
+          <p:cNvSpPr txBox="1"/>
+          <p:nvPr/>
+        </p:nvSpPr>
+        <p:spPr>
+          <a:xfrm>
+            <a:off x="457200" y="274320"/>
+            <a:ext cx="8229600" cy="548640"/>
+          </a:xfrm>
+          <a:prstGeom prst="rect">
+            <a:avLst/>
+          </a:prstGeom>
+          <a:noFill/>
+        </p:spPr>
+        <p:txBody>
+          <a:bodyPr wrap="none">
+            <a:spAutoFit/>
+          </a:bodyPr>
+          <a:lstStyle/>
+          <a:p>
+            <a:pPr algn="ctr">
+              <a:defRPr sz="2400" b="1">
+                <a:solidFill>
+                  <a:srgbClr val="DC3545"/>
+                </a:solidFill>
+              </a:defRPr>
+            </a:pPr>
+            <a:r>
+              <a:t>[SCREENSHOT PLACEHOLDER 9]</a:t>
+            </a:r>
+          </a:p>
+        </p:txBody>
+      </p:sp>
+      <p:sp>
+        <p:nvSpPr>
+          <p:cNvPr id="4" name="TextBox 3"/>
+          <p:cNvSpPr txBox="1"/>
+          <p:nvPr/>
+        </p:nvSpPr>
+        <p:spPr>
+          <a:xfrm>
+            <a:off x="457200" y="914400"/>
+            <a:ext cx="8229600" cy="457200"/>
+          </a:xfrm>
+          <a:prstGeom prst="rect">
+            <a:avLst/>
+          </a:prstGeom>
+          <a:noFill/>
+        </p:spPr>
+        <p:txBody>
+          <a:bodyPr wrap="none">
+            <a:spAutoFit/>
+          </a:bodyPr>
+          <a:lstStyle/>
+          <a:p>
+            <a:pPr algn="ctr">
+              <a:defRPr sz="2000" b="1"/>
+            </a:pPr>
+            <a:r>
+              <a:t>TechCorp Tenant Isolation</a:t>
+            </a:r>
+          </a:p>
+        </p:txBody>
+      </p:sp>
+      <p:sp>
+        <p:nvSpPr>
+          <p:cNvPr id="5" name="TextBox 4"/>
+          <p:cNvSpPr txBox="1"/>
+          <p:nvPr/>
+        </p:nvSpPr>
+        <p:spPr>
+          <a:xfrm>
+            <a:off x="640080" y="1554480"/>
+            <a:ext cx="7863840" cy="731520"/>
+          </a:xfrm>
+          <a:prstGeom prst="rect">
+            <a:avLst/>
+          </a:prstGeom>
+          <a:noFill/>
+        </p:spPr>
+        <p:txBody>
+          <a:bodyPr wrap="square">
+            <a:spAutoFit/>
+          </a:bodyPr>
+          <a:lstStyle/>
+          <a:p>
+            <a:pPr>
+              <a:defRPr sz="1200"/>
+            </a:pPr>
+            <a:r>
+              <a:t>Demonstration of complete data isolation for TechCorp tenant with independent employee database.</a:t>
+            </a:r>
+          </a:p>
+        </p:txBody>
+      </p:sp>
+      <p:sp>
+        <p:nvSpPr>
+          <p:cNvPr id="6" name="TextBox 5"/>
+          <p:cNvSpPr txBox="1"/>
+          <p:nvPr/>
+        </p:nvSpPr>
+        <p:spPr>
+          <a:xfrm>
+            <a:off x="640080" y="2377440"/>
+            <a:ext cx="3749039" cy="3017520"/>
+          </a:xfrm>
+          <a:prstGeom prst="rect">
+            <a:avLst/>
+          </a:prstGeom>
+          <a:noFill/>
+        </p:spPr>
+        <p:txBody>
+          <a:bodyPr wrap="square">
+            <a:spAutoFit/>
+          </a:bodyPr>
+          <a:lstStyle/>
+          <a:p>
+            <a:pPr>
+              <a:spcAft>
+                <a:spcPts val="600"/>
+              </a:spcAft>
+              <a:defRPr sz="1100" b="1"/>
+            </a:pPr>
+            <a:r>
+              <a:t>Key Features:</a:t>
+            </a:r>
+          </a:p>
+          <a:p>
+            <a:pPr>
+              <a:spcAft>
+                <a:spcPts val="300"/>
+              </a:spcAft>
+              <a:defRPr sz="1000"/>
+            </a:pPr>
+            <a:r>
+              <a:t>• TechCorp-specific employee IDs (EMP001-EMP005)</a:t>
+            </a:r>
+          </a:p>
+          <a:p>
+            <a:pPr>
+              <a:spcAft>
+                <a:spcPts val="300"/>
+              </a:spcAft>
+              <a:defRPr sz="1000"/>
+            </a:pPr>
+            <a:r>
+              <a:t>• Isolated shift schedules and templates</a:t>
+            </a:r>
+          </a:p>
+          <a:p>
+            <a:pPr>
+              <a:spcAft>
+                <a:spcPts val="300"/>
+              </a:spcAft>
+              <a:defRPr sz="1000"/>
+            </a:pPr>
+            <a:r>
+              <a:t>• Separate request management</a:t>
+            </a:r>
+          </a:p>
+          <a:p>
+            <a:pPr>
+              <a:spcAft>
+                <a:spcPts val="300"/>
+              </a:spcAft>
+              <a:defRPr sz="1000"/>
+            </a:pPr>
+            <a:r>
+              <a:t>• Independent admin users</a:t>
+            </a:r>
+          </a:p>
+          <a:p>
+            <a:pPr>
+              <a:spcAft>
+                <a:spcPts val="300"/>
+              </a:spcAft>
+              <a:defRPr sz="1000"/>
+            </a:pPr>
+            <a:r>
+              <a:t>• No cross-tenant data access</a:t>
+            </a:r>
+          </a:p>
+        </p:txBody>
+      </p:sp>
+      <p:sp>
+        <p:nvSpPr>
+          <p:cNvPr id="7" name="TextBox 6"/>
+          <p:cNvSpPr txBox="1"/>
+          <p:nvPr/>
+        </p:nvSpPr>
+        <p:spPr>
+          <a:xfrm>
+            <a:off x="4572000" y="2377440"/>
+            <a:ext cx="4206240" cy="1371600"/>
+          </a:xfrm>
+          <a:prstGeom prst="rect">
+            <a:avLst/>
+          </a:prstGeom>
+          <a:noFill/>
+        </p:spPr>
+        <p:txBody>
+          <a:bodyPr wrap="square">
+            <a:spAutoFit/>
+          </a:bodyPr>
+          <a:lstStyle/>
+          <a:p>
+            <a:pPr>
+              <a:spcAft>
+                <a:spcPts val="600"/>
+              </a:spcAft>
+              <a:defRPr sz="1100" b="1"/>
+            </a:pPr>
+            <a:r>
+              <a:t>Access Information:</a:t>
+            </a:r>
+          </a:p>
+          <a:p>
+            <a:pPr>
+              <a:spcAft>
+                <a:spcPts val="300"/>
+              </a:spcAft>
+              <a:defRPr sz="900"/>
+            </a:pPr>
+            <a:r>
+              <a:t>URL: http://localhost:3000/techcorp/admin</a:t>
+            </a:r>
+          </a:p>
+        </p:txBody>
+      </p:sp>
+      <p:sp>
+        <p:nvSpPr>
+          <p:cNvPr id="8" name="TextBox 7"/>
+          <p:cNvSpPr txBox="1"/>
+          <p:nvPr/>
+        </p:nvSpPr>
+        <p:spPr>
+          <a:xfrm>
+            <a:off x="4572000" y="3840480"/>
+            <a:ext cx="4206240" cy="1554480"/>
+          </a:xfrm>
+          <a:prstGeom prst="rect">
+            <a:avLst/>
+          </a:prstGeom>
+          <a:noFill/>
+        </p:spPr>
+        <p:txBody>
+          <a:bodyPr wrap="square">
+            <a:spAutoFit/>
+          </a:bodyPr>
+          <a:lstStyle/>
+          <a:p>
+            <a:pPr>
+              <a:spcAft>
+                <a:spcPts val="600"/>
+              </a:spcAft>
+              <a:defRPr sz="1100" b="1"/>
+            </a:pPr>
+            <a:r>
+              <a:t>How to Use:</a:t>
+            </a:r>
+          </a:p>
+          <a:p>
+            <a:pPr>
+              <a:spcAft>
+                <a:spcPts val="300"/>
+              </a:spcAft>
+              <a:defRPr sz="900"/>
+            </a:pPr>
+            <a:r>
+              <a:t>Login to TechCorp admin panel. Note employee IDs start with EMP. Verify 5 employees with 5-day schedule. Confirm 3 schedule requests are TechCorp-specific.</a:t>
+            </a:r>
+          </a:p>
+        </p:txBody>
+      </p:sp>
+      <p:sp>
+        <p:nvSpPr>
+          <p:cNvPr id="9" name="TextBox 8"/>
+          <p:cNvSpPr txBox="1"/>
+          <p:nvPr/>
+        </p:nvSpPr>
+        <p:spPr>
+          <a:xfrm>
+            <a:off x="640080" y="5760720"/>
+            <a:ext cx="7863840" cy="457200"/>
+          </a:xfrm>
+          <a:prstGeom prst="rect">
+            <a:avLst/>
+          </a:prstGeom>
+          <a:noFill/>
+        </p:spPr>
+        <p:txBody>
+          <a:bodyPr wrap="none">
+            <a:spAutoFit/>
+          </a:bodyPr>
+          <a:lstStyle/>
+          <a:p>
+            <a:pPr algn="ctr">
+              <a:defRPr sz="800" i="1"/>
+            </a:pPr>
+            <a:r>
+              <a:t>Note: This is a placeholder. Replace with actual screenshot after manual capture using credentials provided above.</a:t>
+            </a:r>
+          </a:p>
+        </p:txBody>
+      </p:sp>
+    </p:spTree>
+  </p:cSld>
+  <p:clrMapOvr>
+    <a:masterClrMapping/>
+  </p:clrMapOvr>
+</p:sld>
+</file>
+
+<file path=ppt/slides/slide26.xml><?xml version="1.0" encoding="utf-8"?>
+<p:sld xmlns:a="http://schemas.openxmlformats.org/drawingml/2006/main" xmlns:p="http://schemas.openxmlformats.org/presentationml/2006/main" xmlns:r="http://schemas.openxmlformats.org/officeDocument/2006/relationships">
+  <p:cSld>
+    <p:spTree>
+      <p:nvGrpSpPr>
+        <p:cNvPr id="1" name=""/>
+        <p:cNvGrpSpPr/>
+        <p:nvPr/>
+      </p:nvGrpSpPr>
+      <p:grpSpPr/>
+      <p:sp>
+        <p:nvSpPr>
+          <p:cNvPr id="2" name="Title 1"/>
+          <p:cNvSpPr>
+            <a:spLocks noGrp="1"/>
+          </p:cNvSpPr>
+          <p:nvPr>
+            <p:ph type="title"/>
+          </p:nvPr>
+        </p:nvSpPr>
+        <p:spPr/>
+        <p:txBody>
+          <a:bodyPr/>
+          <a:lstStyle/>
+          <a:p/>
+        </p:txBody>
+      </p:sp>
+      <p:sp>
+        <p:nvSpPr>
+          <p:cNvPr id="3" name="TextBox 2"/>
+          <p:cNvSpPr txBox="1"/>
+          <p:nvPr/>
+        </p:nvSpPr>
+        <p:spPr>
+          <a:xfrm>
+            <a:off x="457200" y="274320"/>
+            <a:ext cx="8229600" cy="548640"/>
+          </a:xfrm>
+          <a:prstGeom prst="rect">
+            <a:avLst/>
+          </a:prstGeom>
+          <a:noFill/>
+        </p:spPr>
+        <p:txBody>
+          <a:bodyPr wrap="none">
+            <a:spAutoFit/>
+          </a:bodyPr>
+          <a:lstStyle/>
+          <a:p>
+            <a:pPr algn="ctr">
+              <a:defRPr sz="2400" b="1">
+                <a:solidFill>
+                  <a:srgbClr val="DC3545"/>
+                </a:solidFill>
+              </a:defRPr>
+            </a:pPr>
+            <a:r>
+              <a:t>[SCREENSHOT PLACEHOLDER 10]</a:t>
+            </a:r>
+          </a:p>
+        </p:txBody>
+      </p:sp>
+      <p:sp>
+        <p:nvSpPr>
+          <p:cNvPr id="4" name="TextBox 3"/>
+          <p:cNvSpPr txBox="1"/>
+          <p:nvPr/>
+        </p:nvSpPr>
+        <p:spPr>
+          <a:xfrm>
+            <a:off x="457200" y="914400"/>
+            <a:ext cx="8229600" cy="457200"/>
+          </a:xfrm>
+          <a:prstGeom prst="rect">
+            <a:avLst/>
+          </a:prstGeom>
+          <a:noFill/>
+        </p:spPr>
+        <p:txBody>
+          <a:bodyPr wrap="none">
+            <a:spAutoFit/>
+          </a:bodyPr>
+          <a:lstStyle/>
+          <a:p>
+            <a:pPr algn="ctr">
+              <a:defRPr sz="2000" b="1"/>
+            </a:pPr>
+            <a:r>
+              <a:t>RetailHub Tenant Isolation</a:t>
+            </a:r>
+          </a:p>
+        </p:txBody>
+      </p:sp>
+      <p:sp>
+        <p:nvSpPr>
+          <p:cNvPr id="5" name="TextBox 4"/>
+          <p:cNvSpPr txBox="1"/>
+          <p:nvPr/>
+        </p:nvSpPr>
+        <p:spPr>
+          <a:xfrm>
+            <a:off x="640080" y="1554480"/>
+            <a:ext cx="7863840" cy="731520"/>
+          </a:xfrm>
+          <a:prstGeom prst="rect">
+            <a:avLst/>
+          </a:prstGeom>
+          <a:noFill/>
+        </p:spPr>
+        <p:txBody>
+          <a:bodyPr wrap="square">
+            <a:spAutoFit/>
+          </a:bodyPr>
+          <a:lstStyle/>
+          <a:p>
+            <a:pPr>
+              <a:defRPr sz="1200"/>
+            </a:pPr>
+            <a:r>
+              <a:t>Demonstration of complete data isolation for RetailHub tenant with separate employee structure.</a:t>
+            </a:r>
+          </a:p>
+        </p:txBody>
+      </p:sp>
+      <p:sp>
+        <p:nvSpPr>
+          <p:cNvPr id="6" name="TextBox 5"/>
+          <p:cNvSpPr txBox="1"/>
+          <p:nvPr/>
+        </p:nvSpPr>
+        <p:spPr>
+          <a:xfrm>
+            <a:off x="640080" y="2377440"/>
+            <a:ext cx="3749039" cy="3017520"/>
+          </a:xfrm>
+          <a:prstGeom prst="rect">
+            <a:avLst/>
+          </a:prstGeom>
+          <a:noFill/>
+        </p:spPr>
+        <p:txBody>
+          <a:bodyPr wrap="square">
+            <a:spAutoFit/>
+          </a:bodyPr>
+          <a:lstStyle/>
+          <a:p>
+            <a:pPr>
+              <a:spcAft>
+                <a:spcPts val="600"/>
+              </a:spcAft>
+              <a:defRPr sz="1100" b="1"/>
+            </a:pPr>
+            <a:r>
+              <a:t>Key Features:</a:t>
+            </a:r>
+          </a:p>
+          <a:p>
+            <a:pPr>
+              <a:spcAft>
+                <a:spcPts val="300"/>
+              </a:spcAft>
+              <a:defRPr sz="1000"/>
+            </a:pPr>
+            <a:r>
+              <a:t>• RetailHub-specific employee IDs (RH001-RH003)</a:t>
+            </a:r>
+          </a:p>
+          <a:p>
+            <a:pPr>
+              <a:spcAft>
+                <a:spcPts val="300"/>
+              </a:spcAft>
+              <a:defRPr sz="1000"/>
+            </a:pPr>
+            <a:r>
+              <a:t>• Different shift patterns and schedules</a:t>
+            </a:r>
+          </a:p>
+          <a:p>
+            <a:pPr>
+              <a:spcAft>
+                <a:spcPts val="300"/>
+              </a:spcAft>
+              <a:defRPr sz="1000"/>
+            </a:pPr>
+            <a:r>
+              <a:t>• Isolated request management</a:t>
+            </a:r>
+          </a:p>
+          <a:p>
+            <a:pPr>
+              <a:spcAft>
+                <a:spcPts val="300"/>
+              </a:spcAft>
+              <a:defRPr sz="1000"/>
+            </a:pPr>
+            <a:r>
+              <a:t>• Independent admin access</a:t>
+            </a:r>
+          </a:p>
+          <a:p>
+            <a:pPr>
+              <a:spcAft>
+                <a:spcPts val="300"/>
+              </a:spcAft>
+              <a:defRPr sz="1000"/>
+            </a:pPr>
+            <a:r>
+              <a:t>• Complete tenant data segregation</a:t>
+            </a:r>
+          </a:p>
+        </p:txBody>
+      </p:sp>
+      <p:sp>
+        <p:nvSpPr>
+          <p:cNvPr id="7" name="TextBox 6"/>
+          <p:cNvSpPr txBox="1"/>
+          <p:nvPr/>
+        </p:nvSpPr>
+        <p:spPr>
+          <a:xfrm>
+            <a:off x="4572000" y="2377440"/>
+            <a:ext cx="4206240" cy="1371600"/>
+          </a:xfrm>
+          <a:prstGeom prst="rect">
+            <a:avLst/>
+          </a:prstGeom>
+          <a:noFill/>
+        </p:spPr>
+        <p:txBody>
+          <a:bodyPr wrap="square">
+            <a:spAutoFit/>
+          </a:bodyPr>
+          <a:lstStyle/>
+          <a:p>
+            <a:pPr>
+              <a:spcAft>
+                <a:spcPts val="600"/>
+              </a:spcAft>
+              <a:defRPr sz="1100" b="1"/>
+            </a:pPr>
+            <a:r>
+              <a:t>Access Information:</a:t>
+            </a:r>
+          </a:p>
+          <a:p>
+            <a:pPr>
+              <a:spcAft>
+                <a:spcPts val="300"/>
+              </a:spcAft>
+              <a:defRPr sz="900"/>
+            </a:pPr>
+            <a:r>
+              <a:t>URL: http://localhost:3000/retailhub/admin</a:t>
+            </a:r>
+          </a:p>
+        </p:txBody>
+      </p:sp>
+      <p:sp>
+        <p:nvSpPr>
+          <p:cNvPr id="8" name="TextBox 7"/>
+          <p:cNvSpPr txBox="1"/>
+          <p:nvPr/>
+        </p:nvSpPr>
+        <p:spPr>
+          <a:xfrm>
+            <a:off x="4572000" y="3840480"/>
+            <a:ext cx="4206240" cy="1554480"/>
+          </a:xfrm>
+          <a:prstGeom prst="rect">
+            <a:avLst/>
+          </a:prstGeom>
+          <a:noFill/>
+        </p:spPr>
+        <p:txBody>
+          <a:bodyPr wrap="square">
+            <a:spAutoFit/>
+          </a:bodyPr>
+          <a:lstStyle/>
+          <a:p>
+            <a:pPr>
+              <a:spcAft>
+                <a:spcPts val="600"/>
+              </a:spcAft>
+              <a:defRPr sz="1100" b="1"/>
+            </a:pPr>
+            <a:r>
+              <a:t>How to Use:</a:t>
+            </a:r>
+          </a:p>
+          <a:p>
+            <a:pPr>
+              <a:spcAft>
+                <a:spcPts val="300"/>
+              </a:spcAft>
+              <a:defRPr sz="900"/>
+            </a:pPr>
+            <a:r>
+              <a:t>Login to RetailHub admin panel. Note employee IDs start with RH. Verify 3 employees with 3-day schedule. Confirm no TechCorp data is visible.</a:t>
+            </a:r>
+          </a:p>
+        </p:txBody>
+      </p:sp>
+      <p:sp>
+        <p:nvSpPr>
+          <p:cNvPr id="9" name="TextBox 8"/>
+          <p:cNvSpPr txBox="1"/>
+          <p:nvPr/>
+        </p:nvSpPr>
+        <p:spPr>
+          <a:xfrm>
+            <a:off x="640080" y="5760720"/>
+            <a:ext cx="7863840" cy="457200"/>
+          </a:xfrm>
+          <a:prstGeom prst="rect">
+            <a:avLst/>
+          </a:prstGeom>
+          <a:noFill/>
+        </p:spPr>
+        <p:txBody>
+          <a:bodyPr wrap="none">
+            <a:spAutoFit/>
+          </a:bodyPr>
+          <a:lstStyle/>
+          <a:p>
+            <a:pPr algn="ctr">
+              <a:defRPr sz="800" i="1"/>
+            </a:pPr>
+            <a:r>
+              <a:t>Note: This is a placeholder. Replace with actual screenshot after manual capture using credentials provided above.</a:t>
             </a:r>
           </a:p>
         </p:txBody>

</xml_diff>